<commit_message>
Added time series slide
</commit_message>
<xml_diff>
--- a/lending_club_case_study.pptx
+++ b/lending_club_case_study.pptx
@@ -5,10 +5,10 @@
     <p:sldMasterId id="2147483648" r:id="rId1"/>
   </p:sldMasterIdLst>
   <p:notesMasterIdLst>
-    <p:notesMasterId r:id="rId12"/>
+    <p:notesMasterId r:id="rId13"/>
   </p:notesMasterIdLst>
   <p:handoutMasterIdLst>
-    <p:handoutMasterId r:id="rId24"/>
+    <p:handoutMasterId r:id="rId25"/>
   </p:handoutMasterIdLst>
   <p:sldIdLst>
     <p:sldId id="256" r:id="rId3"/>
@@ -16,21 +16,22 @@
     <p:sldId id="258" r:id="rId5"/>
     <p:sldId id="259" r:id="rId6"/>
     <p:sldId id="270" r:id="rId7"/>
-    <p:sldId id="261" r:id="rId8"/>
-    <p:sldId id="262" r:id="rId9"/>
-    <p:sldId id="269" r:id="rId10"/>
-    <p:sldId id="264" r:id="rId11"/>
-    <p:sldId id="265" r:id="rId13"/>
-    <p:sldId id="271" r:id="rId14"/>
-    <p:sldId id="272" r:id="rId15"/>
-    <p:sldId id="267" r:id="rId16"/>
-    <p:sldId id="268" r:id="rId17"/>
-    <p:sldId id="279" r:id="rId18"/>
-    <p:sldId id="280" r:id="rId19"/>
-    <p:sldId id="273" r:id="rId20"/>
-    <p:sldId id="274" r:id="rId21"/>
-    <p:sldId id="275" r:id="rId22"/>
-    <p:sldId id="277" r:id="rId23"/>
+    <p:sldId id="286" r:id="rId8"/>
+    <p:sldId id="261" r:id="rId9"/>
+    <p:sldId id="262" r:id="rId10"/>
+    <p:sldId id="269" r:id="rId11"/>
+    <p:sldId id="264" r:id="rId12"/>
+    <p:sldId id="265" r:id="rId14"/>
+    <p:sldId id="271" r:id="rId15"/>
+    <p:sldId id="272" r:id="rId16"/>
+    <p:sldId id="267" r:id="rId17"/>
+    <p:sldId id="268" r:id="rId18"/>
+    <p:sldId id="279" r:id="rId19"/>
+    <p:sldId id="280" r:id="rId20"/>
+    <p:sldId id="273" r:id="rId21"/>
+    <p:sldId id="274" r:id="rId22"/>
+    <p:sldId id="275" r:id="rId23"/>
+    <p:sldId id="277" r:id="rId24"/>
   </p:sldIdLst>
   <p:sldSz cx="12192000" cy="6858000"/>
   <p:notesSz cx="7103745" cy="10234295"/>
@@ -4130,6 +4131,413 @@
           <a:p>
             <a:r>
               <a:rPr lang="en-US"/>
+              <a:t>Home Ownership</a:t>
+            </a:r>
+            <a:endParaRPr lang="en-US"/>
+          </a:p>
+        </p:txBody>
+      </p:sp>
+      <p:pic>
+        <p:nvPicPr>
+          <p:cNvPr id="4" name="Content Placeholder 3"/>
+          <p:cNvPicPr>
+            <a:picLocks noChangeAspect="1"/>
+          </p:cNvPicPr>
+          <p:nvPr>
+            <p:ph idx="1"/>
+          </p:nvPr>
+        </p:nvPicPr>
+        <p:blipFill>
+          <a:blip r:embed="rId1"/>
+          <a:stretch>
+            <a:fillRect/>
+          </a:stretch>
+        </p:blipFill>
+        <p:spPr>
+          <a:xfrm>
+            <a:off x="490855" y="1000760"/>
+            <a:ext cx="3744595" cy="1991360"/>
+          </a:xfrm>
+          <a:prstGeom prst="rect">
+            <a:avLst/>
+          </a:prstGeom>
+        </p:spPr>
+      </p:pic>
+      <p:sp>
+        <p:nvSpPr>
+          <p:cNvPr id="8" name="Text Box 7"/>
+          <p:cNvSpPr txBox="1"/>
+          <p:nvPr/>
+        </p:nvSpPr>
+        <p:spPr>
+          <a:xfrm>
+            <a:off x="5104130" y="1347470"/>
+            <a:ext cx="6478270" cy="1168400"/>
+          </a:xfrm>
+          <a:prstGeom prst="rect">
+            <a:avLst/>
+          </a:prstGeom>
+          <a:noFill/>
+        </p:spPr>
+        <p:txBody>
+          <a:bodyPr wrap="square" rtlCol="0">
+            <a:spAutoFit/>
+          </a:bodyPr>
+          <a:p>
+            <a:pPr marL="285750" indent="-285750">
+              <a:buFont typeface="Arial" panose="02080604020202020204" pitchFamily="34" charset="0"/>
+              <a:buChar char="•"/>
+            </a:pPr>
+            <a:r>
+              <a:rPr lang="en-US" sz="1400"/>
+              <a:t>Most of the borrowers dont have their own house. 92% (47% + 45%) borrowers either pay "Rent" or "Mortgage" their house. </a:t>
+            </a:r>
+            <a:endParaRPr lang="en-US" sz="1400"/>
+          </a:p>
+          <a:p>
+            <a:pPr marL="285750" indent="-285750">
+              <a:buFont typeface="Arial" panose="02080604020202020204" pitchFamily="34" charset="0"/>
+              <a:buChar char="•"/>
+            </a:pPr>
+            <a:r>
+              <a:rPr lang="en-US" sz="1400"/>
+              <a:t>But only 1% borrowers''purpose' of the loan is 'house'. And </a:t>
+            </a:r>
+            <a:r>
+              <a:rPr lang="en-US" sz="1400" b="1"/>
+              <a:t>47%</a:t>
+            </a:r>
+            <a:r>
+              <a:rPr lang="en-US" sz="1400"/>
+              <a:t> borrowers' purpose is </a:t>
+            </a:r>
+            <a:r>
+              <a:rPr lang="en-US" sz="1400" b="1"/>
+              <a:t>'debt_consolidation'</a:t>
+            </a:r>
+            <a:r>
+              <a:rPr lang="en-US" sz="1400"/>
+              <a:t>. </a:t>
+            </a:r>
+            <a:endParaRPr lang="en-US" sz="1400"/>
+          </a:p>
+          <a:p>
+            <a:pPr marL="285750" indent="-285750">
+              <a:buFont typeface="Arial" panose="02080604020202020204" pitchFamily="34" charset="0"/>
+              <a:buChar char="•"/>
+            </a:pPr>
+            <a:r>
+              <a:rPr lang="en-US" sz="1400"/>
+              <a:t>May be because home loan interest rate is high</a:t>
+            </a:r>
+            <a:endParaRPr lang="en-US" sz="1400"/>
+          </a:p>
+        </p:txBody>
+      </p:sp>
+      <p:pic>
+        <p:nvPicPr>
+          <p:cNvPr id="9" name="Picture 8"/>
+          <p:cNvPicPr>
+            <a:picLocks noChangeAspect="1"/>
+          </p:cNvPicPr>
+          <p:nvPr/>
+        </p:nvPicPr>
+        <p:blipFill>
+          <a:blip r:embed="rId2"/>
+          <a:stretch>
+            <a:fillRect/>
+          </a:stretch>
+        </p:blipFill>
+        <p:spPr>
+          <a:xfrm>
+            <a:off x="540385" y="3522345"/>
+            <a:ext cx="4875530" cy="3035300"/>
+          </a:xfrm>
+          <a:prstGeom prst="rect">
+            <a:avLst/>
+          </a:prstGeom>
+        </p:spPr>
+      </p:pic>
+      <p:sp>
+        <p:nvSpPr>
+          <p:cNvPr id="10" name="Rectangles 9"/>
+          <p:cNvSpPr/>
+          <p:nvPr/>
+        </p:nvSpPr>
+        <p:spPr>
+          <a:xfrm>
+            <a:off x="2574925" y="3745865"/>
+            <a:ext cx="216535" cy="2306955"/>
+          </a:xfrm>
+          <a:prstGeom prst="rect">
+            <a:avLst/>
+          </a:prstGeom>
+          <a:noFill/>
+          <a:ln w="9525" cap="flat" cmpd="sng" algn="ctr">
+            <a:solidFill>
+              <a:srgbClr val="C00000"/>
+            </a:solidFill>
+            <a:prstDash val="solid"/>
+            <a:round/>
+            <a:headEnd type="none" w="med" len="med"/>
+            <a:tailEnd type="none" w="med" len="med"/>
+          </a:ln>
+          <a:extLst>
+            <a:ext uri="{909E8E84-426E-40DD-AFC4-6F175D3DCCD1}">
+              <a14:hiddenFill xmlns:a14="http://schemas.microsoft.com/office/drawing/2010/main">
+                <a:gradFill rotWithShape="0">
+                  <a:gsLst>
+                    <a:gs pos="0">
+                      <a:schemeClr val="accent1"/>
+                    </a:gs>
+                    <a:gs pos="100000">
+                      <a:schemeClr val="accent2"/>
+                    </a:gs>
+                  </a:gsLst>
+                  <a:lin ang="5400000" scaled="1"/>
+                </a:gradFill>
+              </a14:hiddenFill>
+            </a:ext>
+          </a:extLst>
+        </p:spPr>
+        <p:txBody>
+          <a:bodyPr vert="horz" wrap="none" lIns="91440" tIns="45720" rIns="91440" bIns="45720" numCol="1" anchor="ctr" anchorCtr="0" compatLnSpc="1"/>
+          <a:p>
+            <a:pPr marL="0" marR="0" indent="0" algn="l" defTabSz="914400" rtl="0" eaLnBrk="1" fontAlgn="base" latinLnBrk="0" hangingPunct="1">
+              <a:lnSpc>
+                <a:spcPct val="100000"/>
+              </a:lnSpc>
+              <a:spcBef>
+                <a:spcPct val="0"/>
+              </a:spcBef>
+              <a:spcAft>
+                <a:spcPct val="0"/>
+              </a:spcAft>
+              <a:buClrTx/>
+              <a:buSzTx/>
+              <a:buFontTx/>
+              <a:buNone/>
+            </a:pPr>
+            <a:endParaRPr kumimoji="0" lang="zh-CN" altLang="en-US" sz="1800" b="0" i="0" u="none" strike="noStrike" cap="none" normalizeH="0" baseline="0" smtClean="0">
+              <a:ln>
+                <a:noFill/>
+              </a:ln>
+              <a:solidFill>
+                <a:schemeClr val="tx1"/>
+              </a:solidFill>
+              <a:effectLst/>
+              <a:latin typeface="Arial" panose="02080604020202020204" pitchFamily="34" charset="0"/>
+              <a:ea typeface="SimSun" pitchFamily="2" charset="-122"/>
+            </a:endParaRPr>
+          </a:p>
+        </p:txBody>
+      </p:sp>
+      <p:sp>
+        <p:nvSpPr>
+          <p:cNvPr id="11" name="Rectangles 10"/>
+          <p:cNvSpPr/>
+          <p:nvPr/>
+        </p:nvSpPr>
+        <p:spPr>
+          <a:xfrm>
+            <a:off x="1644650" y="3746500"/>
+            <a:ext cx="234950" cy="2730500"/>
+          </a:xfrm>
+          <a:prstGeom prst="rect">
+            <a:avLst/>
+          </a:prstGeom>
+          <a:noFill/>
+          <a:ln w="9525" cap="flat" cmpd="sng" algn="ctr">
+            <a:solidFill>
+              <a:srgbClr val="C00000"/>
+            </a:solidFill>
+            <a:prstDash val="solid"/>
+            <a:round/>
+            <a:headEnd type="none" w="med" len="med"/>
+            <a:tailEnd type="none" w="med" len="med"/>
+          </a:ln>
+          <a:extLst>
+            <a:ext uri="{909E8E84-426E-40DD-AFC4-6F175D3DCCD1}">
+              <a14:hiddenFill xmlns:a14="http://schemas.microsoft.com/office/drawing/2010/main">
+                <a:gradFill rotWithShape="0">
+                  <a:gsLst>
+                    <a:gs pos="0">
+                      <a:schemeClr val="accent1"/>
+                    </a:gs>
+                    <a:gs pos="100000">
+                      <a:schemeClr val="accent2"/>
+                    </a:gs>
+                  </a:gsLst>
+                  <a:lin ang="5400000" scaled="1"/>
+                </a:gradFill>
+              </a14:hiddenFill>
+            </a:ext>
+          </a:extLst>
+        </p:spPr>
+        <p:txBody>
+          <a:bodyPr vert="horz" wrap="none" lIns="91440" tIns="45720" rIns="91440" bIns="45720" numCol="1" anchor="ctr" anchorCtr="0" compatLnSpc="1"/>
+          <a:p>
+            <a:pPr marL="0" marR="0" indent="0" algn="l" defTabSz="914400" rtl="0" eaLnBrk="1" fontAlgn="base" latinLnBrk="0" hangingPunct="1">
+              <a:lnSpc>
+                <a:spcPct val="100000"/>
+              </a:lnSpc>
+              <a:spcBef>
+                <a:spcPct val="0"/>
+              </a:spcBef>
+              <a:spcAft>
+                <a:spcPct val="0"/>
+              </a:spcAft>
+              <a:buClrTx/>
+              <a:buSzTx/>
+              <a:buFontTx/>
+              <a:buNone/>
+            </a:pPr>
+            <a:endParaRPr kumimoji="0" lang="zh-CN" altLang="en-US" sz="1800" b="0" i="0" u="none" strike="noStrike" cap="none" normalizeH="0" baseline="0" smtClean="0">
+              <a:ln>
+                <a:noFill/>
+              </a:ln>
+              <a:solidFill>
+                <a:schemeClr val="tx1"/>
+              </a:solidFill>
+              <a:effectLst/>
+              <a:latin typeface="Arial" panose="02080604020202020204" pitchFamily="34" charset="0"/>
+              <a:ea typeface="SimSun" pitchFamily="2" charset="-122"/>
+            </a:endParaRPr>
+          </a:p>
+        </p:txBody>
+      </p:sp>
+      <p:pic>
+        <p:nvPicPr>
+          <p:cNvPr id="12" name="Picture 11"/>
+          <p:cNvPicPr>
+            <a:picLocks noChangeAspect="1"/>
+          </p:cNvPicPr>
+          <p:nvPr/>
+        </p:nvPicPr>
+        <p:blipFill>
+          <a:blip r:embed="rId3"/>
+          <a:stretch>
+            <a:fillRect/>
+          </a:stretch>
+        </p:blipFill>
+        <p:spPr>
+          <a:xfrm>
+            <a:off x="6414135" y="3522345"/>
+            <a:ext cx="5010785" cy="2954655"/>
+          </a:xfrm>
+          <a:prstGeom prst="rect">
+            <a:avLst/>
+          </a:prstGeom>
+        </p:spPr>
+      </p:pic>
+      <p:sp>
+        <p:nvSpPr>
+          <p:cNvPr id="13" name="Rectangles 12"/>
+          <p:cNvSpPr/>
+          <p:nvPr/>
+        </p:nvSpPr>
+        <p:spPr>
+          <a:xfrm>
+            <a:off x="10321925" y="3964305"/>
+            <a:ext cx="292100" cy="2395220"/>
+          </a:xfrm>
+          <a:prstGeom prst="rect">
+            <a:avLst/>
+          </a:prstGeom>
+          <a:noFill/>
+          <a:ln w="28575" cap="flat" cmpd="sng" algn="ctr">
+            <a:solidFill>
+              <a:srgbClr val="C00000"/>
+            </a:solidFill>
+            <a:prstDash val="solid"/>
+            <a:round/>
+            <a:headEnd type="none" w="med" len="med"/>
+            <a:tailEnd type="none" w="med" len="med"/>
+          </a:ln>
+          <a:extLst>
+            <a:ext uri="{909E8E84-426E-40DD-AFC4-6F175D3DCCD1}">
+              <a14:hiddenFill xmlns:a14="http://schemas.microsoft.com/office/drawing/2010/main">
+                <a:gradFill rotWithShape="0">
+                  <a:gsLst>
+                    <a:gs pos="0">
+                      <a:schemeClr val="accent1"/>
+                    </a:gs>
+                    <a:gs pos="100000">
+                      <a:schemeClr val="accent2"/>
+                    </a:gs>
+                  </a:gsLst>
+                  <a:lin ang="5400000" scaled="1"/>
+                </a:gradFill>
+              </a14:hiddenFill>
+            </a:ext>
+          </a:extLst>
+        </p:spPr>
+        <p:txBody>
+          <a:bodyPr vert="horz" wrap="none" lIns="91440" tIns="45720" rIns="91440" bIns="45720" numCol="1" anchor="ctr" anchorCtr="0" compatLnSpc="1"/>
+          <a:p>
+            <a:pPr marL="0" marR="0" indent="0" algn="l" defTabSz="914400" rtl="0" eaLnBrk="1" fontAlgn="base" latinLnBrk="0" hangingPunct="1">
+              <a:lnSpc>
+                <a:spcPct val="100000"/>
+              </a:lnSpc>
+              <a:spcBef>
+                <a:spcPct val="0"/>
+              </a:spcBef>
+              <a:spcAft>
+                <a:spcPct val="0"/>
+              </a:spcAft>
+              <a:buClrTx/>
+              <a:buSzTx/>
+              <a:buFontTx/>
+              <a:buNone/>
+            </a:pPr>
+            <a:endParaRPr kumimoji="0" lang="zh-CN" altLang="en-US" sz="1800" b="0" i="0" u="none" strike="noStrike" cap="none" normalizeH="0" baseline="0" smtClean="0">
+              <a:ln>
+                <a:noFill/>
+              </a:ln>
+              <a:solidFill>
+                <a:schemeClr val="tx1"/>
+              </a:solidFill>
+              <a:effectLst/>
+              <a:latin typeface="Arial" panose="02080604020202020204" pitchFamily="34" charset="0"/>
+              <a:ea typeface="SimSun" pitchFamily="2" charset="-122"/>
+            </a:endParaRPr>
+          </a:p>
+        </p:txBody>
+      </p:sp>
+    </p:spTree>
+  </p:cSld>
+  <p:clrMapOvr>
+    <a:masterClrMapping/>
+  </p:clrMapOvr>
+</p:sld>
+</file>
+
+<file path=ppt/slides/slide11.xml><?xml version="1.0" encoding="utf-8"?>
+<p:sld xmlns:a="http://schemas.openxmlformats.org/drawingml/2006/main" xmlns:r="http://schemas.openxmlformats.org/officeDocument/2006/relationships" xmlns:p="http://schemas.openxmlformats.org/presentationml/2006/main">
+  <p:cSld>
+    <p:spTree>
+      <p:nvGrpSpPr>
+        <p:cNvPr id="1" name=""/>
+        <p:cNvGrpSpPr/>
+        <p:nvPr/>
+      </p:nvGrpSpPr>
+      <p:grpSpPr/>
+      <p:sp>
+        <p:nvSpPr>
+          <p:cNvPr id="2" name="Title 1"/>
+          <p:cNvSpPr>
+            <a:spLocks noGrp="1"/>
+          </p:cNvSpPr>
+          <p:nvPr>
+            <p:ph type="title"/>
+          </p:nvPr>
+        </p:nvSpPr>
+        <p:spPr/>
+        <p:txBody>
+          <a:bodyPr/>
+          <a:p>
+            <a:r>
+              <a:rPr lang="en-US"/>
               <a:t>Verification Status</a:t>
             </a:r>
             <a:endParaRPr lang="en-US"/>
@@ -4461,7 +4869,7 @@
 </p:sld>
 </file>
 
-<file path=ppt/slides/slide11.xml><?xml version="1.0" encoding="utf-8"?>
+<file path=ppt/slides/slide12.xml><?xml version="1.0" encoding="utf-8"?>
 <p:sld xmlns:a="http://schemas.openxmlformats.org/drawingml/2006/main" xmlns:r="http://schemas.openxmlformats.org/officeDocument/2006/relationships" xmlns:p="http://schemas.openxmlformats.org/presentationml/2006/main">
   <p:cSld>
     <p:spTree>
@@ -4932,7 +5340,7 @@
 </p:sld>
 </file>
 
-<file path=ppt/slides/slide12.xml><?xml version="1.0" encoding="utf-8"?>
+<file path=ppt/slides/slide13.xml><?xml version="1.0" encoding="utf-8"?>
 <p:sld xmlns:a="http://schemas.openxmlformats.org/drawingml/2006/main" xmlns:r="http://schemas.openxmlformats.org/officeDocument/2006/relationships" xmlns:p="http://schemas.openxmlformats.org/presentationml/2006/main">
   <p:cSld>
     <p:spTree>
@@ -5197,7 +5605,7 @@
 </p:sld>
 </file>
 
-<file path=ppt/slides/slide13.xml><?xml version="1.0" encoding="utf-8"?>
+<file path=ppt/slides/slide14.xml><?xml version="1.0" encoding="utf-8"?>
 <p:sld xmlns:a="http://schemas.openxmlformats.org/drawingml/2006/main" xmlns:r="http://schemas.openxmlformats.org/officeDocument/2006/relationships" xmlns:p="http://schemas.openxmlformats.org/presentationml/2006/main">
   <p:cSld>
     <p:spTree>
@@ -5836,7 +6244,7 @@
 </p:sld>
 </file>
 
-<file path=ppt/slides/slide14.xml><?xml version="1.0" encoding="utf-8"?>
+<file path=ppt/slides/slide15.xml><?xml version="1.0" encoding="utf-8"?>
 <p:sld xmlns:a="http://schemas.openxmlformats.org/drawingml/2006/main" xmlns:r="http://schemas.openxmlformats.org/officeDocument/2006/relationships" xmlns:p="http://schemas.openxmlformats.org/presentationml/2006/main">
   <p:cSld>
     <p:spTree>
@@ -6043,7 +6451,7 @@
 </p:sld>
 </file>
 
-<file path=ppt/slides/slide15.xml><?xml version="1.0" encoding="utf-8"?>
+<file path=ppt/slides/slide16.xml><?xml version="1.0" encoding="utf-8"?>
 <p:sld xmlns:a="http://schemas.openxmlformats.org/drawingml/2006/main" xmlns:r="http://schemas.openxmlformats.org/officeDocument/2006/relationships" xmlns:p="http://schemas.openxmlformats.org/presentationml/2006/main">
   <p:cSld>
     <p:spTree>
@@ -6340,7 +6748,7 @@
 </p:sld>
 </file>
 
-<file path=ppt/slides/slide16.xml><?xml version="1.0" encoding="utf-8"?>
+<file path=ppt/slides/slide17.xml><?xml version="1.0" encoding="utf-8"?>
 <p:sld xmlns:a="http://schemas.openxmlformats.org/drawingml/2006/main" xmlns:r="http://schemas.openxmlformats.org/officeDocument/2006/relationships" xmlns:p="http://schemas.openxmlformats.org/presentationml/2006/main">
   <p:cSld>
     <p:spTree>
@@ -6516,7 +6924,7 @@
 </p:sld>
 </file>
 
-<file path=ppt/slides/slide17.xml><?xml version="1.0" encoding="utf-8"?>
+<file path=ppt/slides/slide18.xml><?xml version="1.0" encoding="utf-8"?>
 <p:sld xmlns:a="http://schemas.openxmlformats.org/drawingml/2006/main" xmlns:r="http://schemas.openxmlformats.org/officeDocument/2006/relationships" xmlns:p="http://schemas.openxmlformats.org/presentationml/2006/main">
   <p:cSld>
     <p:spTree>
@@ -6946,7 +7354,7 @@
 </p:sld>
 </file>
 
-<file path=ppt/slides/slide18.xml><?xml version="1.0" encoding="utf-8"?>
+<file path=ppt/slides/slide19.xml><?xml version="1.0" encoding="utf-8"?>
 <p:sld xmlns:a="http://schemas.openxmlformats.org/drawingml/2006/main" xmlns:r="http://schemas.openxmlformats.org/officeDocument/2006/relationships" xmlns:p="http://schemas.openxmlformats.org/presentationml/2006/main">
   <p:cSld>
     <p:spTree>
@@ -7277,7 +7685,121 @@
 </p:sld>
 </file>
 
-<file path=ppt/slides/slide19.xml><?xml version="1.0" encoding="utf-8"?>
+<file path=ppt/slides/slide2.xml><?xml version="1.0" encoding="utf-8"?>
+<p:sld xmlns:a="http://schemas.openxmlformats.org/drawingml/2006/main" xmlns:r="http://schemas.openxmlformats.org/officeDocument/2006/relationships" xmlns:p="http://schemas.openxmlformats.org/presentationml/2006/main">
+  <p:cSld>
+    <p:spTree>
+      <p:nvGrpSpPr>
+        <p:cNvPr id="1" name=""/>
+        <p:cNvGrpSpPr/>
+        <p:nvPr/>
+      </p:nvGrpSpPr>
+      <p:grpSpPr/>
+      <p:sp>
+        <p:nvSpPr>
+          <p:cNvPr id="2" name="Title 1"/>
+          <p:cNvSpPr>
+            <a:spLocks noGrp="1"/>
+          </p:cNvSpPr>
+          <p:nvPr>
+            <p:ph type="title"/>
+          </p:nvPr>
+        </p:nvSpPr>
+        <p:spPr/>
+        <p:txBody>
+          <a:bodyPr/>
+          <a:p>
+            <a:r>
+              <a:rPr lang="en-US"/>
+              <a:t>Business Objective</a:t>
+            </a:r>
+            <a:endParaRPr lang="en-US"/>
+          </a:p>
+        </p:txBody>
+      </p:sp>
+      <p:sp>
+        <p:nvSpPr>
+          <p:cNvPr id="3" name="Content Placeholder 2"/>
+          <p:cNvSpPr>
+            <a:spLocks noGrp="1"/>
+          </p:cNvSpPr>
+          <p:nvPr>
+            <p:ph idx="1"/>
+          </p:nvPr>
+        </p:nvSpPr>
+        <p:spPr/>
+        <p:txBody>
+          <a:bodyPr/>
+          <a:p>
+            <a:r>
+              <a:rPr lang="en-US" sz="2000"/>
+              <a:t>The company wants to understand the driving factors behind loan default</a:t>
+            </a:r>
+            <a:endParaRPr lang="en-US" sz="2000"/>
+          </a:p>
+          <a:p>
+            <a:r>
+              <a:rPr lang="en-US" sz="2000"/>
+              <a:t>The variables which are strong indicators of default. </a:t>
+            </a:r>
+            <a:endParaRPr lang="en-US" sz="2000"/>
+          </a:p>
+          <a:p>
+            <a:r>
+              <a:rPr lang="en-US" sz="2000"/>
+              <a:t>The company can utilise this knowledge for its portfolio and risk assessment.</a:t>
+            </a:r>
+            <a:endParaRPr lang="en-US" sz="2000"/>
+          </a:p>
+        </p:txBody>
+      </p:sp>
+      <p:pic>
+        <p:nvPicPr>
+          <p:cNvPr id="5" name="Picture 4"/>
+          <p:cNvPicPr>
+            <a:picLocks noChangeAspect="1"/>
+          </p:cNvPicPr>
+          <p:nvPr/>
+        </p:nvPicPr>
+        <p:blipFill>
+          <a:blip r:embed="rId1">
+            <a:clrChange>
+              <a:clrFrom>
+                <a:srgbClr val="FFFFFF">
+                  <a:alpha val="100000"/>
+                </a:srgbClr>
+              </a:clrFrom>
+              <a:clrTo>
+                <a:srgbClr val="FFFFFF">
+                  <a:alpha val="100000"/>
+                  <a:alpha val="0"/>
+                </a:srgbClr>
+              </a:clrTo>
+            </a:clrChange>
+          </a:blip>
+          <a:stretch>
+            <a:fillRect/>
+          </a:stretch>
+        </p:blipFill>
+        <p:spPr>
+          <a:xfrm>
+            <a:off x="950595" y="3295650"/>
+            <a:ext cx="2621280" cy="2533650"/>
+          </a:xfrm>
+          <a:prstGeom prst="rect">
+            <a:avLst/>
+          </a:prstGeom>
+        </p:spPr>
+      </p:pic>
+    </p:spTree>
+  </p:cSld>
+  <p:clrMapOvr>
+    <a:masterClrMapping/>
+  </p:clrMapOvr>
+</p:sld>
+</file>
+
+<file path=ppt/slides/slide20.xml><?xml version="1.0" encoding="utf-8"?>
 <p:sld xmlns:a="http://schemas.openxmlformats.org/drawingml/2006/main" xmlns:r="http://schemas.openxmlformats.org/officeDocument/2006/relationships" xmlns:p="http://schemas.openxmlformats.org/presentationml/2006/main">
   <p:cSld>
     <p:spTree>
@@ -7715,121 +8237,7 @@
 </p:sld>
 </file>
 
-<file path=ppt/slides/slide2.xml><?xml version="1.0" encoding="utf-8"?>
-<p:sld xmlns:a="http://schemas.openxmlformats.org/drawingml/2006/main" xmlns:r="http://schemas.openxmlformats.org/officeDocument/2006/relationships" xmlns:p="http://schemas.openxmlformats.org/presentationml/2006/main">
-  <p:cSld>
-    <p:spTree>
-      <p:nvGrpSpPr>
-        <p:cNvPr id="1" name=""/>
-        <p:cNvGrpSpPr/>
-        <p:nvPr/>
-      </p:nvGrpSpPr>
-      <p:grpSpPr/>
-      <p:sp>
-        <p:nvSpPr>
-          <p:cNvPr id="2" name="Title 1"/>
-          <p:cNvSpPr>
-            <a:spLocks noGrp="1"/>
-          </p:cNvSpPr>
-          <p:nvPr>
-            <p:ph type="title"/>
-          </p:nvPr>
-        </p:nvSpPr>
-        <p:spPr/>
-        <p:txBody>
-          <a:bodyPr/>
-          <a:p>
-            <a:r>
-              <a:rPr lang="en-US"/>
-              <a:t>Business Objective</a:t>
-            </a:r>
-            <a:endParaRPr lang="en-US"/>
-          </a:p>
-        </p:txBody>
-      </p:sp>
-      <p:sp>
-        <p:nvSpPr>
-          <p:cNvPr id="3" name="Content Placeholder 2"/>
-          <p:cNvSpPr>
-            <a:spLocks noGrp="1"/>
-          </p:cNvSpPr>
-          <p:nvPr>
-            <p:ph idx="1"/>
-          </p:nvPr>
-        </p:nvSpPr>
-        <p:spPr/>
-        <p:txBody>
-          <a:bodyPr/>
-          <a:p>
-            <a:r>
-              <a:rPr lang="en-US" sz="2000"/>
-              <a:t>The company wants to understand the driving factors behind loan default</a:t>
-            </a:r>
-            <a:endParaRPr lang="en-US" sz="2000"/>
-          </a:p>
-          <a:p>
-            <a:r>
-              <a:rPr lang="en-US" sz="2000"/>
-              <a:t>The variables which are strong indicators of default. </a:t>
-            </a:r>
-            <a:endParaRPr lang="en-US" sz="2000"/>
-          </a:p>
-          <a:p>
-            <a:r>
-              <a:rPr lang="en-US" sz="2000"/>
-              <a:t>The company can utilise this knowledge for its portfolio and risk assessment.</a:t>
-            </a:r>
-            <a:endParaRPr lang="en-US" sz="2000"/>
-          </a:p>
-        </p:txBody>
-      </p:sp>
-      <p:pic>
-        <p:nvPicPr>
-          <p:cNvPr id="5" name="Picture 4"/>
-          <p:cNvPicPr>
-            <a:picLocks noChangeAspect="1"/>
-          </p:cNvPicPr>
-          <p:nvPr/>
-        </p:nvPicPr>
-        <p:blipFill>
-          <a:blip r:embed="rId1">
-            <a:clrChange>
-              <a:clrFrom>
-                <a:srgbClr val="FFFFFF">
-                  <a:alpha val="100000"/>
-                </a:srgbClr>
-              </a:clrFrom>
-              <a:clrTo>
-                <a:srgbClr val="FFFFFF">
-                  <a:alpha val="100000"/>
-                  <a:alpha val="0"/>
-                </a:srgbClr>
-              </a:clrTo>
-            </a:clrChange>
-          </a:blip>
-          <a:stretch>
-            <a:fillRect/>
-          </a:stretch>
-        </p:blipFill>
-        <p:spPr>
-          <a:xfrm>
-            <a:off x="950595" y="3295650"/>
-            <a:ext cx="2621280" cy="2533650"/>
-          </a:xfrm>
-          <a:prstGeom prst="rect">
-            <a:avLst/>
-          </a:prstGeom>
-        </p:spPr>
-      </p:pic>
-    </p:spTree>
-  </p:cSld>
-  <p:clrMapOvr>
-    <a:masterClrMapping/>
-  </p:clrMapOvr>
-</p:sld>
-</file>
-
-<file path=ppt/slides/slide20.xml><?xml version="1.0" encoding="utf-8"?>
+<file path=ppt/slides/slide21.xml><?xml version="1.0" encoding="utf-8"?>
 <p:sld xmlns:a="http://schemas.openxmlformats.org/drawingml/2006/main" xmlns:r="http://schemas.openxmlformats.org/officeDocument/2006/relationships" xmlns:p="http://schemas.openxmlformats.org/presentationml/2006/main">
   <p:cSld>
     <p:spTree>
@@ -8542,6 +8950,151 @@
           <a:p>
             <a:r>
               <a:rPr lang="en-US"/>
+              <a:t>Loan vs Time Period</a:t>
+            </a:r>
+            <a:endParaRPr lang="en-US"/>
+          </a:p>
+        </p:txBody>
+      </p:sp>
+      <p:pic>
+        <p:nvPicPr>
+          <p:cNvPr id="4" name="Content Placeholder 3"/>
+          <p:cNvPicPr>
+            <a:picLocks noChangeAspect="1"/>
+          </p:cNvPicPr>
+          <p:nvPr>
+            <p:ph idx="1"/>
+          </p:nvPr>
+        </p:nvPicPr>
+        <p:blipFill>
+          <a:blip r:embed="rId1"/>
+          <a:stretch>
+            <a:fillRect/>
+          </a:stretch>
+        </p:blipFill>
+        <p:spPr>
+          <a:xfrm>
+            <a:off x="609600" y="1285240"/>
+            <a:ext cx="4124325" cy="3933825"/>
+          </a:xfrm>
+          <a:prstGeom prst="rect">
+            <a:avLst/>
+          </a:prstGeom>
+        </p:spPr>
+      </p:pic>
+      <p:pic>
+        <p:nvPicPr>
+          <p:cNvPr id="5" name="Picture 4"/>
+          <p:cNvPicPr>
+            <a:picLocks noChangeAspect="1"/>
+          </p:cNvPicPr>
+          <p:nvPr/>
+        </p:nvPicPr>
+        <p:blipFill>
+          <a:blip r:embed="rId2"/>
+          <a:stretch>
+            <a:fillRect/>
+          </a:stretch>
+        </p:blipFill>
+        <p:spPr>
+          <a:xfrm>
+            <a:off x="5330190" y="1285240"/>
+            <a:ext cx="6191250" cy="3924300"/>
+          </a:xfrm>
+          <a:prstGeom prst="rect">
+            <a:avLst/>
+          </a:prstGeom>
+        </p:spPr>
+      </p:pic>
+      <p:sp>
+        <p:nvSpPr>
+          <p:cNvPr id="6" name="Text Box 5"/>
+          <p:cNvSpPr txBox="1"/>
+          <p:nvPr/>
+        </p:nvSpPr>
+        <p:spPr>
+          <a:xfrm>
+            <a:off x="591820" y="5446395"/>
+            <a:ext cx="10914380" cy="737235"/>
+          </a:xfrm>
+          <a:prstGeom prst="rect">
+            <a:avLst/>
+          </a:prstGeom>
+          <a:noFill/>
+        </p:spPr>
+        <p:txBody>
+          <a:bodyPr wrap="square" rtlCol="0">
+            <a:spAutoFit/>
+          </a:bodyPr>
+          <a:p>
+            <a:pPr marL="285750" indent="-285750">
+              <a:buFont typeface="Arial" panose="02080604020202020204" pitchFamily="34" charset="0"/>
+              <a:buChar char="•"/>
+            </a:pPr>
+            <a:r>
+              <a:rPr lang="en-US" sz="1400"/>
+              <a:t>Number of loan applicants are increasing over the period of time.</a:t>
+            </a:r>
+            <a:endParaRPr lang="en-US" sz="1400"/>
+          </a:p>
+          <a:p>
+            <a:pPr marL="285750" indent="-285750">
+              <a:buFont typeface="Arial" panose="02080604020202020204" pitchFamily="34" charset="0"/>
+              <a:buChar char="•"/>
+            </a:pPr>
+            <a:r>
+              <a:rPr lang="en-US" sz="1400"/>
+              <a:t>Total borrowers in 2011 is highest i.e. 21K</a:t>
+            </a:r>
+            <a:endParaRPr lang="en-US" sz="1400"/>
+          </a:p>
+          <a:p>
+            <a:pPr marL="285750" indent="-285750">
+              <a:buFont typeface="Arial" panose="02080604020202020204" pitchFamily="34" charset="0"/>
+              <a:buChar char="•"/>
+            </a:pPr>
+            <a:r>
+              <a:rPr lang="en-US" sz="1400"/>
+              <a:t>On an average loan amount given to the borrowers is high in 2nf half of the year compared to first half</a:t>
+            </a:r>
+            <a:endParaRPr lang="en-US" sz="1400"/>
+          </a:p>
+        </p:txBody>
+      </p:sp>
+    </p:spTree>
+  </p:cSld>
+  <p:clrMapOvr>
+    <a:masterClrMapping/>
+  </p:clrMapOvr>
+</p:sld>
+</file>
+
+<file path=ppt/slides/slide7.xml><?xml version="1.0" encoding="utf-8"?>
+<p:sld xmlns:a="http://schemas.openxmlformats.org/drawingml/2006/main" xmlns:r="http://schemas.openxmlformats.org/officeDocument/2006/relationships" xmlns:p="http://schemas.openxmlformats.org/presentationml/2006/main">
+  <p:cSld>
+    <p:spTree>
+      <p:nvGrpSpPr>
+        <p:cNvPr id="1" name=""/>
+        <p:cNvGrpSpPr/>
+        <p:nvPr/>
+      </p:nvGrpSpPr>
+      <p:grpSpPr/>
+      <p:sp>
+        <p:nvSpPr>
+          <p:cNvPr id="2" name="Title 1"/>
+          <p:cNvSpPr>
+            <a:spLocks noGrp="1"/>
+          </p:cNvSpPr>
+          <p:nvPr>
+            <p:ph type="title"/>
+          </p:nvPr>
+        </p:nvSpPr>
+        <p:spPr/>
+        <p:txBody>
+          <a:bodyPr/>
+          <a:p>
+            <a:r>
+              <a:rPr lang="en-US"/>
               <a:t>Term, Interest rate, Default Status</a:t>
             </a:r>
             <a:endParaRPr lang="en-US"/>
@@ -8707,7 +9260,7 @@
 </p:sld>
 </file>
 
-<file path=ppt/slides/slide7.xml><?xml version="1.0" encoding="utf-8"?>
+<file path=ppt/slides/slide8.xml><?xml version="1.0" encoding="utf-8"?>
 <p:sld xmlns:a="http://schemas.openxmlformats.org/drawingml/2006/main" xmlns:r="http://schemas.openxmlformats.org/officeDocument/2006/relationships" xmlns:p="http://schemas.openxmlformats.org/presentationml/2006/main">
   <p:cSld>
     <p:spTree>
@@ -9024,7 +9577,7 @@
 </p:sld>
 </file>
 
-<file path=ppt/slides/slide8.xml><?xml version="1.0" encoding="utf-8"?>
+<file path=ppt/slides/slide9.xml><?xml version="1.0" encoding="utf-8"?>
 <p:sld xmlns:a="http://schemas.openxmlformats.org/drawingml/2006/main" xmlns:r="http://schemas.openxmlformats.org/officeDocument/2006/relationships" xmlns:p="http://schemas.openxmlformats.org/presentationml/2006/main">
   <p:cSld>
     <p:spTree>
@@ -9361,413 +9914,6 @@
               <a:srgbClr val="FF0000"/>
             </a:solidFill>
             <a:prstDash val="sysDot"/>
-            <a:round/>
-            <a:headEnd type="none" w="med" len="med"/>
-            <a:tailEnd type="none" w="med" len="med"/>
-          </a:ln>
-          <a:extLst>
-            <a:ext uri="{909E8E84-426E-40DD-AFC4-6F175D3DCCD1}">
-              <a14:hiddenFill xmlns:a14="http://schemas.microsoft.com/office/drawing/2010/main">
-                <a:gradFill rotWithShape="0">
-                  <a:gsLst>
-                    <a:gs pos="0">
-                      <a:schemeClr val="accent1"/>
-                    </a:gs>
-                    <a:gs pos="100000">
-                      <a:schemeClr val="accent2"/>
-                    </a:gs>
-                  </a:gsLst>
-                  <a:lin ang="5400000" scaled="1"/>
-                </a:gradFill>
-              </a14:hiddenFill>
-            </a:ext>
-          </a:extLst>
-        </p:spPr>
-        <p:txBody>
-          <a:bodyPr vert="horz" wrap="none" lIns="91440" tIns="45720" rIns="91440" bIns="45720" numCol="1" anchor="ctr" anchorCtr="0" compatLnSpc="1"/>
-          <a:p>
-            <a:pPr marL="0" marR="0" indent="0" algn="l" defTabSz="914400" rtl="0" eaLnBrk="1" fontAlgn="base" latinLnBrk="0" hangingPunct="1">
-              <a:lnSpc>
-                <a:spcPct val="100000"/>
-              </a:lnSpc>
-              <a:spcBef>
-                <a:spcPct val="0"/>
-              </a:spcBef>
-              <a:spcAft>
-                <a:spcPct val="0"/>
-              </a:spcAft>
-              <a:buClrTx/>
-              <a:buSzTx/>
-              <a:buFontTx/>
-              <a:buNone/>
-            </a:pPr>
-            <a:endParaRPr kumimoji="0" lang="zh-CN" altLang="en-US" sz="1800" b="0" i="0" u="none" strike="noStrike" cap="none" normalizeH="0" baseline="0" smtClean="0">
-              <a:ln>
-                <a:noFill/>
-              </a:ln>
-              <a:solidFill>
-                <a:schemeClr val="tx1"/>
-              </a:solidFill>
-              <a:effectLst/>
-              <a:latin typeface="Arial" panose="02080604020202020204" pitchFamily="34" charset="0"/>
-              <a:ea typeface="SimSun" pitchFamily="2" charset="-122"/>
-            </a:endParaRPr>
-          </a:p>
-        </p:txBody>
-      </p:sp>
-    </p:spTree>
-  </p:cSld>
-  <p:clrMapOvr>
-    <a:masterClrMapping/>
-  </p:clrMapOvr>
-</p:sld>
-</file>
-
-<file path=ppt/slides/slide9.xml><?xml version="1.0" encoding="utf-8"?>
-<p:sld xmlns:a="http://schemas.openxmlformats.org/drawingml/2006/main" xmlns:r="http://schemas.openxmlformats.org/officeDocument/2006/relationships" xmlns:p="http://schemas.openxmlformats.org/presentationml/2006/main">
-  <p:cSld>
-    <p:spTree>
-      <p:nvGrpSpPr>
-        <p:cNvPr id="1" name=""/>
-        <p:cNvGrpSpPr/>
-        <p:nvPr/>
-      </p:nvGrpSpPr>
-      <p:grpSpPr/>
-      <p:sp>
-        <p:nvSpPr>
-          <p:cNvPr id="2" name="Title 1"/>
-          <p:cNvSpPr>
-            <a:spLocks noGrp="1"/>
-          </p:cNvSpPr>
-          <p:nvPr>
-            <p:ph type="title"/>
-          </p:nvPr>
-        </p:nvSpPr>
-        <p:spPr/>
-        <p:txBody>
-          <a:bodyPr/>
-          <a:p>
-            <a:r>
-              <a:rPr lang="en-US"/>
-              <a:t>Home Ownership</a:t>
-            </a:r>
-            <a:endParaRPr lang="en-US"/>
-          </a:p>
-        </p:txBody>
-      </p:sp>
-      <p:pic>
-        <p:nvPicPr>
-          <p:cNvPr id="4" name="Content Placeholder 3"/>
-          <p:cNvPicPr>
-            <a:picLocks noChangeAspect="1"/>
-          </p:cNvPicPr>
-          <p:nvPr>
-            <p:ph idx="1"/>
-          </p:nvPr>
-        </p:nvPicPr>
-        <p:blipFill>
-          <a:blip r:embed="rId1"/>
-          <a:stretch>
-            <a:fillRect/>
-          </a:stretch>
-        </p:blipFill>
-        <p:spPr>
-          <a:xfrm>
-            <a:off x="490855" y="1000760"/>
-            <a:ext cx="3744595" cy="1991360"/>
-          </a:xfrm>
-          <a:prstGeom prst="rect">
-            <a:avLst/>
-          </a:prstGeom>
-        </p:spPr>
-      </p:pic>
-      <p:sp>
-        <p:nvSpPr>
-          <p:cNvPr id="8" name="Text Box 7"/>
-          <p:cNvSpPr txBox="1"/>
-          <p:nvPr/>
-        </p:nvSpPr>
-        <p:spPr>
-          <a:xfrm>
-            <a:off x="5104130" y="1347470"/>
-            <a:ext cx="6478270" cy="1168400"/>
-          </a:xfrm>
-          <a:prstGeom prst="rect">
-            <a:avLst/>
-          </a:prstGeom>
-          <a:noFill/>
-        </p:spPr>
-        <p:txBody>
-          <a:bodyPr wrap="square" rtlCol="0">
-            <a:spAutoFit/>
-          </a:bodyPr>
-          <a:p>
-            <a:pPr marL="285750" indent="-285750">
-              <a:buFont typeface="Arial" panose="02080604020202020204" pitchFamily="34" charset="0"/>
-              <a:buChar char="•"/>
-            </a:pPr>
-            <a:r>
-              <a:rPr lang="en-US" sz="1400"/>
-              <a:t>Most of the borrowers dont have their own house. 92% (47% + 45%) borrowers either pay "Rent" or "Mortgage" their house. </a:t>
-            </a:r>
-            <a:endParaRPr lang="en-US" sz="1400"/>
-          </a:p>
-          <a:p>
-            <a:pPr marL="285750" indent="-285750">
-              <a:buFont typeface="Arial" panose="02080604020202020204" pitchFamily="34" charset="0"/>
-              <a:buChar char="•"/>
-            </a:pPr>
-            <a:r>
-              <a:rPr lang="en-US" sz="1400"/>
-              <a:t>But only 1% borrowers''purpose' of the loan is 'house'. And </a:t>
-            </a:r>
-            <a:r>
-              <a:rPr lang="en-US" sz="1400" b="1"/>
-              <a:t>47%</a:t>
-            </a:r>
-            <a:r>
-              <a:rPr lang="en-US" sz="1400"/>
-              <a:t> borrowers' purpose is </a:t>
-            </a:r>
-            <a:r>
-              <a:rPr lang="en-US" sz="1400" b="1"/>
-              <a:t>'debt_consolidation'</a:t>
-            </a:r>
-            <a:r>
-              <a:rPr lang="en-US" sz="1400"/>
-              <a:t>. </a:t>
-            </a:r>
-            <a:endParaRPr lang="en-US" sz="1400"/>
-          </a:p>
-          <a:p>
-            <a:pPr marL="285750" indent="-285750">
-              <a:buFont typeface="Arial" panose="02080604020202020204" pitchFamily="34" charset="0"/>
-              <a:buChar char="•"/>
-            </a:pPr>
-            <a:r>
-              <a:rPr lang="en-US" sz="1400"/>
-              <a:t>May be because home loan interest rate is high</a:t>
-            </a:r>
-            <a:endParaRPr lang="en-US" sz="1400"/>
-          </a:p>
-        </p:txBody>
-      </p:sp>
-      <p:pic>
-        <p:nvPicPr>
-          <p:cNvPr id="9" name="Picture 8"/>
-          <p:cNvPicPr>
-            <a:picLocks noChangeAspect="1"/>
-          </p:cNvPicPr>
-          <p:nvPr/>
-        </p:nvPicPr>
-        <p:blipFill>
-          <a:blip r:embed="rId2"/>
-          <a:stretch>
-            <a:fillRect/>
-          </a:stretch>
-        </p:blipFill>
-        <p:spPr>
-          <a:xfrm>
-            <a:off x="540385" y="3522345"/>
-            <a:ext cx="4875530" cy="3035300"/>
-          </a:xfrm>
-          <a:prstGeom prst="rect">
-            <a:avLst/>
-          </a:prstGeom>
-        </p:spPr>
-      </p:pic>
-      <p:sp>
-        <p:nvSpPr>
-          <p:cNvPr id="10" name="Rectangles 9"/>
-          <p:cNvSpPr/>
-          <p:nvPr/>
-        </p:nvSpPr>
-        <p:spPr>
-          <a:xfrm>
-            <a:off x="2574925" y="3745865"/>
-            <a:ext cx="216535" cy="2306955"/>
-          </a:xfrm>
-          <a:prstGeom prst="rect">
-            <a:avLst/>
-          </a:prstGeom>
-          <a:noFill/>
-          <a:ln w="9525" cap="flat" cmpd="sng" algn="ctr">
-            <a:solidFill>
-              <a:srgbClr val="C00000"/>
-            </a:solidFill>
-            <a:prstDash val="solid"/>
-            <a:round/>
-            <a:headEnd type="none" w="med" len="med"/>
-            <a:tailEnd type="none" w="med" len="med"/>
-          </a:ln>
-          <a:extLst>
-            <a:ext uri="{909E8E84-426E-40DD-AFC4-6F175D3DCCD1}">
-              <a14:hiddenFill xmlns:a14="http://schemas.microsoft.com/office/drawing/2010/main">
-                <a:gradFill rotWithShape="0">
-                  <a:gsLst>
-                    <a:gs pos="0">
-                      <a:schemeClr val="accent1"/>
-                    </a:gs>
-                    <a:gs pos="100000">
-                      <a:schemeClr val="accent2"/>
-                    </a:gs>
-                  </a:gsLst>
-                  <a:lin ang="5400000" scaled="1"/>
-                </a:gradFill>
-              </a14:hiddenFill>
-            </a:ext>
-          </a:extLst>
-        </p:spPr>
-        <p:txBody>
-          <a:bodyPr vert="horz" wrap="none" lIns="91440" tIns="45720" rIns="91440" bIns="45720" numCol="1" anchor="ctr" anchorCtr="0" compatLnSpc="1"/>
-          <a:p>
-            <a:pPr marL="0" marR="0" indent="0" algn="l" defTabSz="914400" rtl="0" eaLnBrk="1" fontAlgn="base" latinLnBrk="0" hangingPunct="1">
-              <a:lnSpc>
-                <a:spcPct val="100000"/>
-              </a:lnSpc>
-              <a:spcBef>
-                <a:spcPct val="0"/>
-              </a:spcBef>
-              <a:spcAft>
-                <a:spcPct val="0"/>
-              </a:spcAft>
-              <a:buClrTx/>
-              <a:buSzTx/>
-              <a:buFontTx/>
-              <a:buNone/>
-            </a:pPr>
-            <a:endParaRPr kumimoji="0" lang="zh-CN" altLang="en-US" sz="1800" b="0" i="0" u="none" strike="noStrike" cap="none" normalizeH="0" baseline="0" smtClean="0">
-              <a:ln>
-                <a:noFill/>
-              </a:ln>
-              <a:solidFill>
-                <a:schemeClr val="tx1"/>
-              </a:solidFill>
-              <a:effectLst/>
-              <a:latin typeface="Arial" panose="02080604020202020204" pitchFamily="34" charset="0"/>
-              <a:ea typeface="SimSun" pitchFamily="2" charset="-122"/>
-            </a:endParaRPr>
-          </a:p>
-        </p:txBody>
-      </p:sp>
-      <p:sp>
-        <p:nvSpPr>
-          <p:cNvPr id="11" name="Rectangles 10"/>
-          <p:cNvSpPr/>
-          <p:nvPr/>
-        </p:nvSpPr>
-        <p:spPr>
-          <a:xfrm>
-            <a:off x="1644650" y="3746500"/>
-            <a:ext cx="234950" cy="2730500"/>
-          </a:xfrm>
-          <a:prstGeom prst="rect">
-            <a:avLst/>
-          </a:prstGeom>
-          <a:noFill/>
-          <a:ln w="9525" cap="flat" cmpd="sng" algn="ctr">
-            <a:solidFill>
-              <a:srgbClr val="C00000"/>
-            </a:solidFill>
-            <a:prstDash val="solid"/>
-            <a:round/>
-            <a:headEnd type="none" w="med" len="med"/>
-            <a:tailEnd type="none" w="med" len="med"/>
-          </a:ln>
-          <a:extLst>
-            <a:ext uri="{909E8E84-426E-40DD-AFC4-6F175D3DCCD1}">
-              <a14:hiddenFill xmlns:a14="http://schemas.microsoft.com/office/drawing/2010/main">
-                <a:gradFill rotWithShape="0">
-                  <a:gsLst>
-                    <a:gs pos="0">
-                      <a:schemeClr val="accent1"/>
-                    </a:gs>
-                    <a:gs pos="100000">
-                      <a:schemeClr val="accent2"/>
-                    </a:gs>
-                  </a:gsLst>
-                  <a:lin ang="5400000" scaled="1"/>
-                </a:gradFill>
-              </a14:hiddenFill>
-            </a:ext>
-          </a:extLst>
-        </p:spPr>
-        <p:txBody>
-          <a:bodyPr vert="horz" wrap="none" lIns="91440" tIns="45720" rIns="91440" bIns="45720" numCol="1" anchor="ctr" anchorCtr="0" compatLnSpc="1"/>
-          <a:p>
-            <a:pPr marL="0" marR="0" indent="0" algn="l" defTabSz="914400" rtl="0" eaLnBrk="1" fontAlgn="base" latinLnBrk="0" hangingPunct="1">
-              <a:lnSpc>
-                <a:spcPct val="100000"/>
-              </a:lnSpc>
-              <a:spcBef>
-                <a:spcPct val="0"/>
-              </a:spcBef>
-              <a:spcAft>
-                <a:spcPct val="0"/>
-              </a:spcAft>
-              <a:buClrTx/>
-              <a:buSzTx/>
-              <a:buFontTx/>
-              <a:buNone/>
-            </a:pPr>
-            <a:endParaRPr kumimoji="0" lang="zh-CN" altLang="en-US" sz="1800" b="0" i="0" u="none" strike="noStrike" cap="none" normalizeH="0" baseline="0" smtClean="0">
-              <a:ln>
-                <a:noFill/>
-              </a:ln>
-              <a:solidFill>
-                <a:schemeClr val="tx1"/>
-              </a:solidFill>
-              <a:effectLst/>
-              <a:latin typeface="Arial" panose="02080604020202020204" pitchFamily="34" charset="0"/>
-              <a:ea typeface="SimSun" pitchFamily="2" charset="-122"/>
-            </a:endParaRPr>
-          </a:p>
-        </p:txBody>
-      </p:sp>
-      <p:pic>
-        <p:nvPicPr>
-          <p:cNvPr id="12" name="Picture 11"/>
-          <p:cNvPicPr>
-            <a:picLocks noChangeAspect="1"/>
-          </p:cNvPicPr>
-          <p:nvPr/>
-        </p:nvPicPr>
-        <p:blipFill>
-          <a:blip r:embed="rId3"/>
-          <a:stretch>
-            <a:fillRect/>
-          </a:stretch>
-        </p:blipFill>
-        <p:spPr>
-          <a:xfrm>
-            <a:off x="6414135" y="3522345"/>
-            <a:ext cx="5010785" cy="2954655"/>
-          </a:xfrm>
-          <a:prstGeom prst="rect">
-            <a:avLst/>
-          </a:prstGeom>
-        </p:spPr>
-      </p:pic>
-      <p:sp>
-        <p:nvSpPr>
-          <p:cNvPr id="13" name="Rectangles 12"/>
-          <p:cNvSpPr/>
-          <p:nvPr/>
-        </p:nvSpPr>
-        <p:spPr>
-          <a:xfrm>
-            <a:off x="10321925" y="3964305"/>
-            <a:ext cx="292100" cy="2395220"/>
-          </a:xfrm>
-          <a:prstGeom prst="rect">
-            <a:avLst/>
-          </a:prstGeom>
-          <a:noFill/>
-          <a:ln w="28575" cap="flat" cmpd="sng" algn="ctr">
-            <a:solidFill>
-              <a:srgbClr val="C00000"/>
-            </a:solidFill>
-            <a:prstDash val="solid"/>
             <a:round/>
             <a:headEnd type="none" w="med" len="med"/>
             <a:tailEnd type="none" w="med" len="med"/>

</xml_diff>

<commit_message>
Small changes done Added conclusion and time series slide in ppt Converted ppt to pdf Modified some graphs in jupyter notebook and renamed
</commit_message>
<xml_diff>
--- a/lending_club_case_study.pptx
+++ b/lending_club_case_study.pptx
@@ -8,7 +8,7 @@
     <p:notesMasterId r:id="rId12"/>
   </p:notesMasterIdLst>
   <p:handoutMasterIdLst>
-    <p:handoutMasterId r:id="rId25"/>
+    <p:handoutMasterId r:id="rId24"/>
   </p:handoutMasterIdLst>
   <p:sldIdLst>
     <p:sldId id="256" r:id="rId3"/>
@@ -26,12 +26,11 @@
     <p:sldId id="267" r:id="rId16"/>
     <p:sldId id="268" r:id="rId17"/>
     <p:sldId id="279" r:id="rId18"/>
-    <p:sldId id="280" r:id="rId19"/>
-    <p:sldId id="273" r:id="rId20"/>
-    <p:sldId id="274" r:id="rId21"/>
-    <p:sldId id="275" r:id="rId22"/>
-    <p:sldId id="287" r:id="rId23"/>
-    <p:sldId id="277" r:id="rId24"/>
+    <p:sldId id="273" r:id="rId19"/>
+    <p:sldId id="274" r:id="rId20"/>
+    <p:sldId id="275" r:id="rId21"/>
+    <p:sldId id="287" r:id="rId22"/>
+    <p:sldId id="277" r:id="rId23"/>
   </p:sldIdLst>
   <p:sldSz cx="12192000" cy="6858000"/>
   <p:notesSz cx="7103745" cy="10234295"/>
@@ -5981,13 +5980,56 @@
           </a:p>
         </p:txBody>
       </p:sp>
+      <p:sp>
+        <p:nvSpPr>
+          <p:cNvPr id="6" name="Text Box 5"/>
+          <p:cNvSpPr txBox="1"/>
+          <p:nvPr/>
+        </p:nvSpPr>
+        <p:spPr>
+          <a:xfrm>
+            <a:off x="704850" y="4171950"/>
+            <a:ext cx="4410710" cy="737235"/>
+          </a:xfrm>
+          <a:prstGeom prst="rect">
+            <a:avLst/>
+          </a:prstGeom>
+          <a:noFill/>
+        </p:spPr>
+        <p:txBody>
+          <a:bodyPr wrap="square" rtlCol="0">
+            <a:spAutoFit/>
+          </a:bodyPr>
+          <a:p>
+            <a:pPr marL="171450" indent="-171450">
+              <a:buFont typeface="Arial" panose="02080604020202020204" pitchFamily="34" charset="0"/>
+              <a:buChar char="•"/>
+            </a:pPr>
+            <a:r>
+              <a:rPr lang="en-US" sz="1400">
+                <a:sym typeface="+mn-ea"/>
+              </a:rPr>
+              <a:t>Funded amount by the company is always less than or equal to loan amount </a:t>
+            </a:r>
+            <a:r>
+              <a:rPr lang="en-US" sz="1400">
+                <a:sym typeface="+mn-ea"/>
+              </a:rPr>
+              <a:t>applied by borrower.</a:t>
+            </a:r>
+            <a:endParaRPr lang="en-US" sz="1400"/>
+          </a:p>
+        </p:txBody>
+      </p:sp>
       <p:pic>
         <p:nvPicPr>
-          <p:cNvPr id="5" name="Picture 4"/>
+          <p:cNvPr id="10" name="Content Placeholder 9"/>
           <p:cNvPicPr>
             <a:picLocks noChangeAspect="1"/>
           </p:cNvPicPr>
-          <p:nvPr/>
+          <p:nvPr>
+            <p:ph idx="1"/>
+          </p:nvPr>
         </p:nvPicPr>
         <p:blipFill>
           <a:blip r:embed="rId1">
@@ -6011,8 +6053,8 @@
         </p:blipFill>
         <p:spPr>
           <a:xfrm>
-            <a:off x="7024370" y="1102995"/>
-            <a:ext cx="3610610" cy="2751455"/>
+            <a:off x="1028700" y="1096645"/>
+            <a:ext cx="3619500" cy="2757805"/>
           </a:xfrm>
           <a:prstGeom prst="rect">
             <a:avLst/>
@@ -6021,13 +6063,13 @@
       </p:pic>
       <p:sp>
         <p:nvSpPr>
-          <p:cNvPr id="6" name="Text Box 5"/>
+          <p:cNvPr id="11" name="Text Box 10"/>
           <p:cNvSpPr txBox="1"/>
           <p:nvPr/>
         </p:nvSpPr>
         <p:spPr>
           <a:xfrm>
-            <a:off x="704850" y="4171950"/>
+            <a:off x="6624320" y="4184015"/>
             <a:ext cx="4410710" cy="737235"/>
           </a:xfrm>
           <a:prstGeom prst="rect">
@@ -6048,27 +6090,60 @@
               <a:rPr lang="en-US" sz="1400">
                 <a:sym typeface="+mn-ea"/>
               </a:rPr>
-              <a:t>Funded amount by the company is always less than or equal to loan amount </a:t>
-            </a:r>
-            <a:r>
-              <a:rPr lang="en-US" sz="1400">
-                <a:sym typeface="+mn-ea"/>
-              </a:rPr>
-              <a:t>applied by borrower.</a:t>
+              <a:t>Funded amount by the company is highly correlated with monthly installment paid by the borrower.</a:t>
             </a:r>
             <a:endParaRPr lang="en-US" sz="1400"/>
+          </a:p>
+        </p:txBody>
+      </p:sp>
+      <p:sp>
+        <p:nvSpPr>
+          <p:cNvPr id="12" name="Text Box 11"/>
+          <p:cNvSpPr txBox="1"/>
+          <p:nvPr/>
+        </p:nvSpPr>
+        <p:spPr>
+          <a:xfrm>
+            <a:off x="548640" y="5375910"/>
+            <a:ext cx="9943465" cy="368300"/>
+          </a:xfrm>
+          <a:prstGeom prst="rect">
+            <a:avLst/>
+          </a:prstGeom>
+          <a:noFill/>
+        </p:spPr>
+        <p:txBody>
+          <a:bodyPr wrap="square" rtlCol="0">
+            <a:spAutoFit/>
+          </a:bodyPr>
+          <a:p>
+            <a:pPr marL="285750" indent="-285750">
+              <a:buFont typeface="Arial" panose="02080604020202020204" pitchFamily="34" charset="0"/>
+              <a:buChar char="•"/>
+            </a:pPr>
+            <a:r>
+              <a:rPr lang="en-US"/>
+              <a:t>There is a </a:t>
+            </a:r>
+            <a:r>
+              <a:rPr lang="en-US" b="1"/>
+              <a:t>high </a:t>
+            </a:r>
+            <a:r>
+              <a:rPr lang="en-US"/>
+              <a:t>correltion between loan amount, funded amount and installment</a:t>
+            </a:r>
+            <a:endParaRPr lang="en-US"/>
           </a:p>
         </p:txBody>
       </p:sp>
       <p:pic>
         <p:nvPicPr>
-          <p:cNvPr id="10" name="Content Placeholder 9"/>
+          <p:cNvPr id="3" name="Picture 2"/>
           <p:cNvPicPr>
             <a:picLocks noChangeAspect="1"/>
           </p:cNvPicPr>
-          <p:nvPr>
-            <p:ph idx="1"/>
-          </p:nvPr>
+          <p:nvPr/>
         </p:nvPicPr>
         <p:blipFill>
           <a:blip r:embed="rId2">
@@ -6092,90 +6167,14 @@
         </p:blipFill>
         <p:spPr>
           <a:xfrm>
-            <a:off x="1028700" y="1096645"/>
-            <a:ext cx="3619500" cy="2757805"/>
+            <a:off x="6771640" y="1099185"/>
+            <a:ext cx="3637280" cy="2755265"/>
           </a:xfrm>
           <a:prstGeom prst="rect">
             <a:avLst/>
           </a:prstGeom>
         </p:spPr>
       </p:pic>
-      <p:sp>
-        <p:nvSpPr>
-          <p:cNvPr id="11" name="Text Box 10"/>
-          <p:cNvSpPr txBox="1"/>
-          <p:nvPr/>
-        </p:nvSpPr>
-        <p:spPr>
-          <a:xfrm>
-            <a:off x="6624320" y="4184015"/>
-            <a:ext cx="4410710" cy="737235"/>
-          </a:xfrm>
-          <a:prstGeom prst="rect">
-            <a:avLst/>
-          </a:prstGeom>
-          <a:noFill/>
-        </p:spPr>
-        <p:txBody>
-          <a:bodyPr wrap="square" rtlCol="0">
-            <a:spAutoFit/>
-          </a:bodyPr>
-          <a:p>
-            <a:pPr marL="171450" indent="-171450">
-              <a:buFont typeface="Arial" panose="02080604020202020204" pitchFamily="34" charset="0"/>
-              <a:buChar char="•"/>
-            </a:pPr>
-            <a:r>
-              <a:rPr lang="en-US" sz="1400">
-                <a:sym typeface="+mn-ea"/>
-              </a:rPr>
-              <a:t>Funded amount by the company is highly correlated with monthly installment paid by the borrower.</a:t>
-            </a:r>
-            <a:endParaRPr lang="en-US" sz="1400"/>
-          </a:p>
-        </p:txBody>
-      </p:sp>
-      <p:sp>
-        <p:nvSpPr>
-          <p:cNvPr id="12" name="Text Box 11"/>
-          <p:cNvSpPr txBox="1"/>
-          <p:nvPr/>
-        </p:nvSpPr>
-        <p:spPr>
-          <a:xfrm>
-            <a:off x="548640" y="5375910"/>
-            <a:ext cx="9943465" cy="368300"/>
-          </a:xfrm>
-          <a:prstGeom prst="rect">
-            <a:avLst/>
-          </a:prstGeom>
-          <a:noFill/>
-        </p:spPr>
-        <p:txBody>
-          <a:bodyPr wrap="square" rtlCol="0">
-            <a:spAutoFit/>
-          </a:bodyPr>
-          <a:p>
-            <a:pPr marL="285750" indent="-285750">
-              <a:buFont typeface="Arial" panose="02080604020202020204" pitchFamily="34" charset="0"/>
-              <a:buChar char="•"/>
-            </a:pPr>
-            <a:r>
-              <a:rPr lang="en-US"/>
-              <a:t>There is a </a:t>
-            </a:r>
-            <a:r>
-              <a:rPr lang="en-US" b="1"/>
-              <a:t>high </a:t>
-            </a:r>
-            <a:r>
-              <a:rPr lang="en-US"/>
-              <a:t>correltion between loan amount, funded amount and installment</a:t>
-            </a:r>
-            <a:endParaRPr lang="en-US"/>
-          </a:p>
-        </p:txBody>
-      </p:sp>
     </p:spTree>
   </p:cSld>
   <p:clrMapOvr>
@@ -6350,10 +6349,6 @@
               <a:buFont typeface="Arial" panose="02080604020202020204" pitchFamily="34" charset="0"/>
               <a:buChar char="•"/>
             </a:pPr>
-            <a:r>
-              <a:rPr lang="en-US" sz="1400"/>
-              <a:t>Company is making profit.</a:t>
-            </a:r>
             <a:endParaRPr lang="en-US" sz="1400"/>
           </a:p>
           <a:p>
@@ -6549,7 +6544,7 @@
           <a:p>
             <a:r>
               <a:rPr lang="en-US"/>
-              <a:t>total_acc &amp; open_acc</a:t>
+              <a:t>Impact of Term and Grade - Loan Status</a:t>
             </a:r>
             <a:endParaRPr lang="en-US"/>
           </a:p>
@@ -6587,8 +6582,8 @@
         </p:blipFill>
         <p:spPr>
           <a:xfrm>
-            <a:off x="609600" y="1202690"/>
-            <a:ext cx="1781175" cy="2933700"/>
+            <a:off x="5767070" y="3090545"/>
+            <a:ext cx="5267325" cy="3228975"/>
           </a:xfrm>
           <a:prstGeom prst="rect">
             <a:avLst/>
@@ -6625,8 +6620,8 @@
         </p:blipFill>
         <p:spPr>
           <a:xfrm>
-            <a:off x="3300095" y="1202690"/>
-            <a:ext cx="1781175" cy="2933700"/>
+            <a:off x="323850" y="3090545"/>
+            <a:ext cx="5276850" cy="3133725"/>
           </a:xfrm>
           <a:prstGeom prst="rect">
             <a:avLst/>
@@ -6635,14 +6630,14 @@
       </p:pic>
       <p:sp>
         <p:nvSpPr>
-          <p:cNvPr id="7" name="Text Box 6"/>
+          <p:cNvPr id="6" name="Text Box 5"/>
           <p:cNvSpPr txBox="1"/>
           <p:nvPr/>
         </p:nvSpPr>
         <p:spPr>
           <a:xfrm>
-            <a:off x="619125" y="4514850"/>
-            <a:ext cx="10934700" cy="1198880"/>
+            <a:off x="450850" y="1004570"/>
+            <a:ext cx="11020425" cy="953135"/>
           </a:xfrm>
           <a:prstGeom prst="rect">
             <a:avLst/>
@@ -6659,10 +6654,10 @@
               <a:buChar char="•"/>
             </a:pPr>
             <a:r>
-              <a:rPr lang="en-US"/>
-              <a:t>Avg total number of credit lines in borrowers credit file is 22</a:t>
-            </a:r>
-            <a:endParaRPr lang="en-US"/>
+              <a:rPr lang="en-US" sz="1400"/>
+              <a:t>Highest number of loans (24%) have 36 months tenure with grade A and have lowest default rate (5.9%). This is very good for company.</a:t>
+            </a:r>
+            <a:endParaRPr lang="en-US" sz="1400"/>
           </a:p>
           <a:p>
             <a:pPr marL="285750" indent="-285750">
@@ -6670,69 +6665,309 @@
               <a:buChar char="•"/>
             </a:pPr>
             <a:r>
-              <a:rPr lang="en-US"/>
-              <a:t>Out of that on an avg total number of open credit lines is 9</a:t>
-            </a:r>
-            <a:endParaRPr lang="en-US"/>
-          </a:p>
-          <a:p>
-            <a:pPr marL="285750" indent="-285750">
-              <a:buFont typeface="Arial" panose="02080604020202020204" pitchFamily="34" charset="0"/>
-              <a:buChar char="•"/>
-            </a:pPr>
-            <a:r>
-              <a:rPr lang="en-US"/>
-              <a:t>total_acc and open_acc is moderately high correlated.</a:t>
-            </a:r>
-            <a:endParaRPr lang="en-US"/>
-          </a:p>
-          <a:p>
-            <a:pPr indent="0">
-              <a:buFont typeface="Arial" panose="02080604020202020204" pitchFamily="34" charset="0"/>
+              <a:rPr lang="en-US" sz="1400"/>
+              <a:t>The company has only 0.1% of total loans with 36 months tenure and G grade. And these loans have highest risk of 37.5% of default rate. </a:t>
+            </a:r>
+            <a:endParaRPr lang="en-US" sz="1400"/>
+          </a:p>
+        </p:txBody>
+      </p:sp>
+      <p:sp>
+        <p:nvSpPr>
+          <p:cNvPr id="7" name="Rectangles 6"/>
+          <p:cNvSpPr/>
+          <p:nvPr/>
+        </p:nvSpPr>
+        <p:spPr>
+          <a:xfrm>
+            <a:off x="898525" y="3757295"/>
+            <a:ext cx="466725" cy="714375"/>
+          </a:xfrm>
+          <a:prstGeom prst="rect">
+            <a:avLst/>
+          </a:prstGeom>
+          <a:noFill/>
+          <a:ln w="19050" cap="flat" cmpd="sng" algn="ctr">
+            <a:solidFill>
+              <a:srgbClr val="FF0000"/>
+            </a:solidFill>
+            <a:prstDash val="solid"/>
+            <a:round/>
+            <a:headEnd type="none" w="med" len="med"/>
+            <a:tailEnd type="none" w="med" len="med"/>
+          </a:ln>
+          <a:extLst>
+            <a:ext uri="{909E8E84-426E-40DD-AFC4-6F175D3DCCD1}">
+              <a14:hiddenFill xmlns:a14="http://schemas.microsoft.com/office/drawing/2010/main">
+                <a:gradFill rotWithShape="0">
+                  <a:gsLst>
+                    <a:gs pos="0">
+                      <a:schemeClr val="accent1"/>
+                    </a:gs>
+                    <a:gs pos="100000">
+                      <a:schemeClr val="accent2"/>
+                    </a:gs>
+                  </a:gsLst>
+                  <a:lin ang="5400000" scaled="1"/>
+                </a:gradFill>
+              </a14:hiddenFill>
+            </a:ext>
+          </a:extLst>
+        </p:spPr>
+        <p:txBody>
+          <a:bodyPr vert="horz" wrap="none" lIns="91440" tIns="45720" rIns="91440" bIns="45720" numCol="1" anchor="ctr" anchorCtr="0" compatLnSpc="1"/>
+          <a:p>
+            <a:pPr marL="0" marR="0" indent="0" algn="l" defTabSz="914400" rtl="0" eaLnBrk="1" fontAlgn="base" latinLnBrk="0" hangingPunct="1">
+              <a:lnSpc>
+                <a:spcPct val="100000"/>
+              </a:lnSpc>
+              <a:spcBef>
+                <a:spcPct val="0"/>
+              </a:spcBef>
+              <a:spcAft>
+                <a:spcPct val="0"/>
+              </a:spcAft>
+              <a:buClrTx/>
+              <a:buSzTx/>
+              <a:buFontTx/>
               <a:buNone/>
             </a:pPr>
-            <a:endParaRPr lang="en-US"/>
-          </a:p>
-        </p:txBody>
-      </p:sp>
-      <p:pic>
-        <p:nvPicPr>
-          <p:cNvPr id="8" name="Picture 7"/>
-          <p:cNvPicPr>
-            <a:picLocks noChangeAspect="1"/>
-          </p:cNvPicPr>
+            <a:endParaRPr kumimoji="0" lang="zh-CN" altLang="en-US" sz="1800" b="0" i="0" u="none" strike="noStrike" cap="none" normalizeH="0" baseline="0" smtClean="0">
+              <a:ln>
+                <a:noFill/>
+              </a:ln>
+              <a:solidFill>
+                <a:schemeClr val="tx1"/>
+              </a:solidFill>
+              <a:effectLst/>
+              <a:latin typeface="Arial" panose="02080604020202020204" pitchFamily="34" charset="0"/>
+              <a:ea typeface="SimSun" pitchFamily="2" charset="-122"/>
+            </a:endParaRPr>
+          </a:p>
+        </p:txBody>
+      </p:sp>
+      <p:sp>
+        <p:nvSpPr>
+          <p:cNvPr id="8" name="Rectangles 7"/>
+          <p:cNvSpPr/>
           <p:nvPr/>
-        </p:nvPicPr>
-        <p:blipFill>
-          <a:blip r:embed="rId3">
-            <a:clrChange>
-              <a:clrFrom>
-                <a:srgbClr val="FFFFFF">
-                  <a:alpha val="100000"/>
-                </a:srgbClr>
-              </a:clrFrom>
-              <a:clrTo>
-                <a:srgbClr val="FFFFFF">
-                  <a:alpha val="100000"/>
-                  <a:alpha val="0"/>
-                </a:srgbClr>
-              </a:clrTo>
-            </a:clrChange>
-          </a:blip>
-          <a:stretch>
-            <a:fillRect/>
-          </a:stretch>
-        </p:blipFill>
-        <p:spPr>
-          <a:xfrm>
-            <a:off x="5990590" y="1202690"/>
-            <a:ext cx="3762375" cy="2960370"/>
+        </p:nvSpPr>
+        <p:spPr>
+          <a:xfrm>
+            <a:off x="6292850" y="3757295"/>
+            <a:ext cx="466725" cy="714375"/>
           </a:xfrm>
           <a:prstGeom prst="rect">
             <a:avLst/>
           </a:prstGeom>
-        </p:spPr>
-      </p:pic>
+          <a:noFill/>
+          <a:ln w="19050" cap="flat" cmpd="sng" algn="ctr">
+            <a:solidFill>
+              <a:srgbClr val="FF0000"/>
+            </a:solidFill>
+            <a:prstDash val="solid"/>
+            <a:round/>
+            <a:headEnd type="none" w="med" len="med"/>
+            <a:tailEnd type="none" w="med" len="med"/>
+          </a:ln>
+          <a:extLst>
+            <a:ext uri="{909E8E84-426E-40DD-AFC4-6F175D3DCCD1}">
+              <a14:hiddenFill xmlns:a14="http://schemas.microsoft.com/office/drawing/2010/main">
+                <a:gradFill rotWithShape="0">
+                  <a:gsLst>
+                    <a:gs pos="0">
+                      <a:schemeClr val="accent1"/>
+                    </a:gs>
+                    <a:gs pos="100000">
+                      <a:schemeClr val="accent2"/>
+                    </a:gs>
+                  </a:gsLst>
+                  <a:lin ang="5400000" scaled="1"/>
+                </a:gradFill>
+              </a14:hiddenFill>
+            </a:ext>
+          </a:extLst>
+        </p:spPr>
+        <p:txBody>
+          <a:bodyPr vert="horz" wrap="none" lIns="91440" tIns="45720" rIns="91440" bIns="45720" numCol="1" anchor="ctr" anchorCtr="0" compatLnSpc="1"/>
+          <a:p>
+            <a:pPr marL="0" marR="0" indent="0" algn="l" defTabSz="914400" rtl="0" eaLnBrk="1" fontAlgn="base" latinLnBrk="0" hangingPunct="1">
+              <a:lnSpc>
+                <a:spcPct val="100000"/>
+              </a:lnSpc>
+              <a:spcBef>
+                <a:spcPct val="0"/>
+              </a:spcBef>
+              <a:spcAft>
+                <a:spcPct val="0"/>
+              </a:spcAft>
+              <a:buClrTx/>
+              <a:buSzTx/>
+              <a:buFontTx/>
+              <a:buNone/>
+            </a:pPr>
+            <a:endParaRPr kumimoji="0" lang="zh-CN" altLang="en-US" sz="1800" b="0" i="0" u="none" strike="noStrike" cap="none" normalizeH="0" baseline="0" smtClean="0">
+              <a:ln>
+                <a:noFill/>
+              </a:ln>
+              <a:solidFill>
+                <a:schemeClr val="tx1"/>
+              </a:solidFill>
+              <a:effectLst/>
+              <a:latin typeface="Arial" panose="02080604020202020204" pitchFamily="34" charset="0"/>
+              <a:ea typeface="SimSun" pitchFamily="2" charset="-122"/>
+            </a:endParaRPr>
+          </a:p>
+        </p:txBody>
+      </p:sp>
+      <p:sp>
+        <p:nvSpPr>
+          <p:cNvPr id="9" name="Rectangles 8"/>
+          <p:cNvSpPr/>
+          <p:nvPr/>
+        </p:nvSpPr>
+        <p:spPr>
+          <a:xfrm>
+            <a:off x="4921250" y="3757295"/>
+            <a:ext cx="466725" cy="714375"/>
+          </a:xfrm>
+          <a:prstGeom prst="rect">
+            <a:avLst/>
+          </a:prstGeom>
+          <a:noFill/>
+          <a:ln w="19050" cap="flat" cmpd="sng" algn="ctr">
+            <a:solidFill>
+              <a:srgbClr val="00B0F0"/>
+            </a:solidFill>
+            <a:prstDash val="solid"/>
+            <a:round/>
+            <a:headEnd type="none" w="med" len="med"/>
+            <a:tailEnd type="none" w="med" len="med"/>
+          </a:ln>
+          <a:extLst>
+            <a:ext uri="{909E8E84-426E-40DD-AFC4-6F175D3DCCD1}">
+              <a14:hiddenFill xmlns:a14="http://schemas.microsoft.com/office/drawing/2010/main">
+                <a:gradFill rotWithShape="0">
+                  <a:gsLst>
+                    <a:gs pos="0">
+                      <a:schemeClr val="accent1"/>
+                    </a:gs>
+                    <a:gs pos="100000">
+                      <a:schemeClr val="accent2"/>
+                    </a:gs>
+                  </a:gsLst>
+                  <a:lin ang="5400000" scaled="1"/>
+                </a:gradFill>
+              </a14:hiddenFill>
+            </a:ext>
+          </a:extLst>
+        </p:spPr>
+        <p:txBody>
+          <a:bodyPr vert="horz" wrap="none" lIns="91440" tIns="45720" rIns="91440" bIns="45720" numCol="1" anchor="ctr" anchorCtr="0" compatLnSpc="1"/>
+          <a:p>
+            <a:pPr marL="0" marR="0" indent="0" algn="l" defTabSz="914400" rtl="0" eaLnBrk="1" fontAlgn="base" latinLnBrk="0" hangingPunct="1">
+              <a:lnSpc>
+                <a:spcPct val="100000"/>
+              </a:lnSpc>
+              <a:spcBef>
+                <a:spcPct val="0"/>
+              </a:spcBef>
+              <a:spcAft>
+                <a:spcPct val="0"/>
+              </a:spcAft>
+              <a:buClrTx/>
+              <a:buSzTx/>
+              <a:buFontTx/>
+              <a:buNone/>
+            </a:pPr>
+            <a:endParaRPr kumimoji="0" lang="zh-CN" altLang="en-US" sz="1800" b="0" i="0" u="none" strike="noStrike" cap="none" normalizeH="0" baseline="0" smtClean="0">
+              <a:ln>
+                <a:noFill/>
+              </a:ln>
+              <a:solidFill>
+                <a:schemeClr val="tx1"/>
+              </a:solidFill>
+              <a:effectLst/>
+              <a:latin typeface="Arial" panose="02080604020202020204" pitchFamily="34" charset="0"/>
+              <a:ea typeface="SimSun" pitchFamily="2" charset="-122"/>
+            </a:endParaRPr>
+          </a:p>
+        </p:txBody>
+      </p:sp>
+      <p:sp>
+        <p:nvSpPr>
+          <p:cNvPr id="10" name="Rectangles 9"/>
+          <p:cNvSpPr/>
+          <p:nvPr/>
+        </p:nvSpPr>
+        <p:spPr>
+          <a:xfrm>
+            <a:off x="10382250" y="3757295"/>
+            <a:ext cx="466725" cy="714375"/>
+          </a:xfrm>
+          <a:prstGeom prst="rect">
+            <a:avLst/>
+          </a:prstGeom>
+          <a:noFill/>
+          <a:ln w="19050" cap="flat" cmpd="sng" algn="ctr">
+            <a:solidFill>
+              <a:srgbClr val="00B0F0"/>
+            </a:solidFill>
+            <a:prstDash val="solid"/>
+            <a:round/>
+            <a:headEnd type="none" w="med" len="med"/>
+            <a:tailEnd type="none" w="med" len="med"/>
+          </a:ln>
+          <a:extLst>
+            <a:ext uri="{909E8E84-426E-40DD-AFC4-6F175D3DCCD1}">
+              <a14:hiddenFill xmlns:a14="http://schemas.microsoft.com/office/drawing/2010/main">
+                <a:gradFill rotWithShape="0">
+                  <a:gsLst>
+                    <a:gs pos="0">
+                      <a:schemeClr val="accent1"/>
+                    </a:gs>
+                    <a:gs pos="100000">
+                      <a:schemeClr val="accent2"/>
+                    </a:gs>
+                  </a:gsLst>
+                  <a:lin ang="5400000" scaled="1"/>
+                </a:gradFill>
+              </a14:hiddenFill>
+            </a:ext>
+          </a:extLst>
+        </p:spPr>
+        <p:txBody>
+          <a:bodyPr vert="horz" wrap="none" lIns="91440" tIns="45720" rIns="91440" bIns="45720" numCol="1" anchor="ctr" anchorCtr="0" compatLnSpc="1"/>
+          <a:p>
+            <a:pPr marL="0" marR="0" indent="0" algn="l" defTabSz="914400" rtl="0" eaLnBrk="1" fontAlgn="base" latinLnBrk="0" hangingPunct="1">
+              <a:lnSpc>
+                <a:spcPct val="100000"/>
+              </a:lnSpc>
+              <a:spcBef>
+                <a:spcPct val="0"/>
+              </a:spcBef>
+              <a:spcAft>
+                <a:spcPct val="0"/>
+              </a:spcAft>
+              <a:buClrTx/>
+              <a:buSzTx/>
+              <a:buFontTx/>
+              <a:buNone/>
+            </a:pPr>
+            <a:endParaRPr kumimoji="0" lang="zh-CN" altLang="en-US" sz="1800" b="0" i="0" u="none" strike="noStrike" cap="none" normalizeH="0" baseline="0" smtClean="0">
+              <a:ln>
+                <a:noFill/>
+              </a:ln>
+              <a:solidFill>
+                <a:schemeClr val="tx1"/>
+              </a:solidFill>
+              <a:effectLst/>
+              <a:latin typeface="Arial" panose="02080604020202020204" pitchFamily="34" charset="0"/>
+              <a:ea typeface="SimSun" pitchFamily="2" charset="-122"/>
+            </a:endParaRPr>
+          </a:p>
+        </p:txBody>
+      </p:sp>
     </p:spTree>
   </p:cSld>
   <p:clrMapOvr>
@@ -6766,10 +7001,12 @@
           <a:bodyPr/>
           <a:p>
             <a:r>
-              <a:rPr lang="en-US"/>
-              <a:t>Term and Grade - Loan Status</a:t>
-            </a:r>
-            <a:endParaRPr lang="en-US"/>
+              <a:rPr lang="en-US" sz="2800">
+                <a:sym typeface="+mn-ea"/>
+              </a:rPr>
+              <a:t>Impact of Emp_length and Verification Status - Loan Status</a:t>
+            </a:r>
+            <a:endParaRPr lang="en-US" sz="2800"/>
           </a:p>
         </p:txBody>
       </p:sp>
@@ -6805,8 +7042,8 @@
         </p:blipFill>
         <p:spPr>
           <a:xfrm>
-            <a:off x="5767070" y="3090545"/>
-            <a:ext cx="5267325" cy="3228975"/>
+            <a:off x="6060440" y="2569210"/>
+            <a:ext cx="5753100" cy="3219450"/>
           </a:xfrm>
           <a:prstGeom prst="rect">
             <a:avLst/>
@@ -6843,8 +7080,8 @@
         </p:blipFill>
         <p:spPr>
           <a:xfrm>
-            <a:off x="323850" y="3090545"/>
-            <a:ext cx="5276850" cy="3133725"/>
+            <a:off x="345440" y="2569210"/>
+            <a:ext cx="5715000" cy="3219450"/>
           </a:xfrm>
           <a:prstGeom prst="rect">
             <a:avLst/>
@@ -6853,14 +7090,14 @@
       </p:pic>
       <p:sp>
         <p:nvSpPr>
-          <p:cNvPr id="6" name="Text Box 5"/>
+          <p:cNvPr id="7" name="Text Box 6"/>
           <p:cNvSpPr txBox="1"/>
           <p:nvPr/>
         </p:nvSpPr>
         <p:spPr>
           <a:xfrm>
-            <a:off x="450850" y="1004570"/>
-            <a:ext cx="11020425" cy="953135"/>
+            <a:off x="610235" y="956310"/>
+            <a:ext cx="11203305" cy="1168400"/>
           </a:xfrm>
           <a:prstGeom prst="rect">
             <a:avLst/>
@@ -6868,7 +7105,7 @@
           <a:noFill/>
         </p:spPr>
         <p:txBody>
-          <a:bodyPr wrap="square" rtlCol="0">
+          <a:bodyPr wrap="square" rtlCol="0" anchor="t">
             <a:spAutoFit/>
           </a:bodyPr>
           <a:p>
@@ -6876,11 +7113,12 @@
               <a:buFont typeface="Arial" panose="02080604020202020204" pitchFamily="34" charset="0"/>
               <a:buChar char="•"/>
             </a:pPr>
-            <a:r>
-              <a:rPr lang="en-US" sz="1400"/>
-              <a:t>Highest number of loans (24%) have 36 months tenure with grade A and have lowest default rate (5.9%). This is very good for company.</a:t>
-            </a:r>
-            <a:endParaRPr lang="en-US" sz="1400"/>
+            <a:endParaRPr lang="en-US" sz="1400">
+              <a:solidFill>
+                <a:schemeClr val="tx1"/>
+              </a:solidFill>
+              <a:sym typeface="+mn-ea"/>
+            </a:endParaRPr>
           </a:p>
           <a:p>
             <a:pPr marL="285750" indent="-285750">
@@ -6888,29 +7126,75 @@
               <a:buChar char="•"/>
             </a:pPr>
             <a:r>
-              <a:rPr lang="en-US" sz="1400"/>
-              <a:t>The company has only 0.1% of total loans with 36 months tenure and G grade. And these loans have highest risk of 37.5% of default rate. </a:t>
-            </a:r>
-            <a:endParaRPr lang="en-US" sz="1400"/>
-          </a:p>
-        </p:txBody>
-      </p:sp>
-      <p:sp>
-        <p:nvSpPr>
-          <p:cNvPr id="7" name="Rectangles 6"/>
+              <a:rPr lang="en-US" sz="1400">
+                <a:solidFill>
+                  <a:schemeClr val="tx1"/>
+                </a:solidFill>
+                <a:sym typeface="+mn-ea"/>
+              </a:rPr>
+              <a:t>Borrowers who have 10+ years of employment years and whose income is verified by lending company are highest 9%. And thier default rate is maximum i.e. 17.2%. </a:t>
+            </a:r>
+            <a:endParaRPr lang="en-US" sz="1400">
+              <a:solidFill>
+                <a:schemeClr val="tx1"/>
+              </a:solidFill>
+              <a:sym typeface="+mn-ea"/>
+            </a:endParaRPr>
+          </a:p>
+          <a:p>
+            <a:pPr marL="285750" indent="-285750">
+              <a:buFont typeface="Arial" panose="02080604020202020204" pitchFamily="34" charset="0"/>
+              <a:buChar char="•"/>
+            </a:pPr>
+            <a:r>
+              <a:rPr lang="en-US" sz="1400">
+                <a:solidFill>
+                  <a:schemeClr val="tx1"/>
+                </a:solidFill>
+                <a:sym typeface="+mn-ea"/>
+              </a:rPr>
+              <a:t>This is not a good situation for the company.</a:t>
+            </a:r>
+            <a:endParaRPr lang="en-US" sz="1400">
+              <a:solidFill>
+                <a:schemeClr val="tx1"/>
+              </a:solidFill>
+              <a:sym typeface="+mn-ea"/>
+            </a:endParaRPr>
+          </a:p>
+          <a:p>
+            <a:pPr marL="285750" indent="-285750">
+              <a:buFont typeface="Arial" panose="02080604020202020204" pitchFamily="34" charset="0"/>
+              <a:buChar char="•"/>
+            </a:pPr>
+            <a:r>
+              <a:rPr lang="en-US" sz="1400">
+                <a:sym typeface="+mn-ea"/>
+              </a:rPr>
+              <a:t>This is the criteria where company should look into it. </a:t>
+            </a:r>
+            <a:endParaRPr lang="en-US" sz="1400">
+              <a:sym typeface="+mn-ea"/>
+            </a:endParaRPr>
+          </a:p>
+        </p:txBody>
+      </p:sp>
+      <p:sp>
+        <p:nvSpPr>
+          <p:cNvPr id="8" name="Rectangles 7"/>
           <p:cNvSpPr/>
           <p:nvPr/>
         </p:nvSpPr>
         <p:spPr>
           <a:xfrm>
-            <a:off x="898525" y="3757295"/>
-            <a:ext cx="466725" cy="714375"/>
+            <a:off x="4749165" y="3295015"/>
+            <a:ext cx="685800" cy="228600"/>
           </a:xfrm>
           <a:prstGeom prst="rect">
             <a:avLst/>
           </a:prstGeom>
           <a:noFill/>
-          <a:ln w="19050" cap="flat" cmpd="sng" algn="ctr">
+          <a:ln w="28575" cap="flat" cmpd="sng" algn="ctr">
             <a:solidFill>
               <a:srgbClr val="FF0000"/>
             </a:solidFill>
@@ -6971,20 +7255,20 @@
       </p:sp>
       <p:sp>
         <p:nvSpPr>
-          <p:cNvPr id="8" name="Rectangles 7"/>
+          <p:cNvPr id="9" name="Rectangles 8"/>
           <p:cNvSpPr/>
           <p:nvPr/>
         </p:nvSpPr>
         <p:spPr>
           <a:xfrm>
-            <a:off x="6292850" y="3757295"/>
-            <a:ext cx="466725" cy="714375"/>
+            <a:off x="10524490" y="3295015"/>
+            <a:ext cx="685800" cy="228600"/>
           </a:xfrm>
           <a:prstGeom prst="rect">
             <a:avLst/>
           </a:prstGeom>
           <a:noFill/>
-          <a:ln w="19050" cap="flat" cmpd="sng" algn="ctr">
+          <a:ln w="28575" cap="flat" cmpd="sng" algn="ctr">
             <a:solidFill>
               <a:srgbClr val="FF0000"/>
             </a:solidFill>
@@ -7043,154 +7327,6 @@
           </a:p>
         </p:txBody>
       </p:sp>
-      <p:sp>
-        <p:nvSpPr>
-          <p:cNvPr id="9" name="Rectangles 8"/>
-          <p:cNvSpPr/>
-          <p:nvPr/>
-        </p:nvSpPr>
-        <p:spPr>
-          <a:xfrm>
-            <a:off x="4921250" y="3757295"/>
-            <a:ext cx="466725" cy="714375"/>
-          </a:xfrm>
-          <a:prstGeom prst="rect">
-            <a:avLst/>
-          </a:prstGeom>
-          <a:noFill/>
-          <a:ln w="19050" cap="flat" cmpd="sng" algn="ctr">
-            <a:solidFill>
-              <a:srgbClr val="00B0F0"/>
-            </a:solidFill>
-            <a:prstDash val="solid"/>
-            <a:round/>
-            <a:headEnd type="none" w="med" len="med"/>
-            <a:tailEnd type="none" w="med" len="med"/>
-          </a:ln>
-          <a:extLst>
-            <a:ext uri="{909E8E84-426E-40DD-AFC4-6F175D3DCCD1}">
-              <a14:hiddenFill xmlns:a14="http://schemas.microsoft.com/office/drawing/2010/main">
-                <a:gradFill rotWithShape="0">
-                  <a:gsLst>
-                    <a:gs pos="0">
-                      <a:schemeClr val="accent1"/>
-                    </a:gs>
-                    <a:gs pos="100000">
-                      <a:schemeClr val="accent2"/>
-                    </a:gs>
-                  </a:gsLst>
-                  <a:lin ang="5400000" scaled="1"/>
-                </a:gradFill>
-              </a14:hiddenFill>
-            </a:ext>
-          </a:extLst>
-        </p:spPr>
-        <p:txBody>
-          <a:bodyPr vert="horz" wrap="none" lIns="91440" tIns="45720" rIns="91440" bIns="45720" numCol="1" anchor="ctr" anchorCtr="0" compatLnSpc="1"/>
-          <a:p>
-            <a:pPr marL="0" marR="0" indent="0" algn="l" defTabSz="914400" rtl="0" eaLnBrk="1" fontAlgn="base" latinLnBrk="0" hangingPunct="1">
-              <a:lnSpc>
-                <a:spcPct val="100000"/>
-              </a:lnSpc>
-              <a:spcBef>
-                <a:spcPct val="0"/>
-              </a:spcBef>
-              <a:spcAft>
-                <a:spcPct val="0"/>
-              </a:spcAft>
-              <a:buClrTx/>
-              <a:buSzTx/>
-              <a:buFontTx/>
-              <a:buNone/>
-            </a:pPr>
-            <a:endParaRPr kumimoji="0" lang="zh-CN" altLang="en-US" sz="1800" b="0" i="0" u="none" strike="noStrike" cap="none" normalizeH="0" baseline="0" smtClean="0">
-              <a:ln>
-                <a:noFill/>
-              </a:ln>
-              <a:solidFill>
-                <a:schemeClr val="tx1"/>
-              </a:solidFill>
-              <a:effectLst/>
-              <a:latin typeface="Arial" panose="02080604020202020204" pitchFamily="34" charset="0"/>
-              <a:ea typeface="SimSun" pitchFamily="2" charset="-122"/>
-            </a:endParaRPr>
-          </a:p>
-        </p:txBody>
-      </p:sp>
-      <p:sp>
-        <p:nvSpPr>
-          <p:cNvPr id="10" name="Rectangles 9"/>
-          <p:cNvSpPr/>
-          <p:nvPr/>
-        </p:nvSpPr>
-        <p:spPr>
-          <a:xfrm>
-            <a:off x="10382250" y="3757295"/>
-            <a:ext cx="466725" cy="714375"/>
-          </a:xfrm>
-          <a:prstGeom prst="rect">
-            <a:avLst/>
-          </a:prstGeom>
-          <a:noFill/>
-          <a:ln w="19050" cap="flat" cmpd="sng" algn="ctr">
-            <a:solidFill>
-              <a:srgbClr val="00B0F0"/>
-            </a:solidFill>
-            <a:prstDash val="solid"/>
-            <a:round/>
-            <a:headEnd type="none" w="med" len="med"/>
-            <a:tailEnd type="none" w="med" len="med"/>
-          </a:ln>
-          <a:extLst>
-            <a:ext uri="{909E8E84-426E-40DD-AFC4-6F175D3DCCD1}">
-              <a14:hiddenFill xmlns:a14="http://schemas.microsoft.com/office/drawing/2010/main">
-                <a:gradFill rotWithShape="0">
-                  <a:gsLst>
-                    <a:gs pos="0">
-                      <a:schemeClr val="accent1"/>
-                    </a:gs>
-                    <a:gs pos="100000">
-                      <a:schemeClr val="accent2"/>
-                    </a:gs>
-                  </a:gsLst>
-                  <a:lin ang="5400000" scaled="1"/>
-                </a:gradFill>
-              </a14:hiddenFill>
-            </a:ext>
-          </a:extLst>
-        </p:spPr>
-        <p:txBody>
-          <a:bodyPr vert="horz" wrap="none" lIns="91440" tIns="45720" rIns="91440" bIns="45720" numCol="1" anchor="ctr" anchorCtr="0" compatLnSpc="1"/>
-          <a:p>
-            <a:pPr marL="0" marR="0" indent="0" algn="l" defTabSz="914400" rtl="0" eaLnBrk="1" fontAlgn="base" latinLnBrk="0" hangingPunct="1">
-              <a:lnSpc>
-                <a:spcPct val="100000"/>
-              </a:lnSpc>
-              <a:spcBef>
-                <a:spcPct val="0"/>
-              </a:spcBef>
-              <a:spcAft>
-                <a:spcPct val="0"/>
-              </a:spcAft>
-              <a:buClrTx/>
-              <a:buSzTx/>
-              <a:buFontTx/>
-              <a:buNone/>
-            </a:pPr>
-            <a:endParaRPr kumimoji="0" lang="zh-CN" altLang="en-US" sz="1800" b="0" i="0" u="none" strike="noStrike" cap="none" normalizeH="0" baseline="0" smtClean="0">
-              <a:ln>
-                <a:noFill/>
-              </a:ln>
-              <a:solidFill>
-                <a:schemeClr val="tx1"/>
-              </a:solidFill>
-              <a:effectLst/>
-              <a:latin typeface="Arial" panose="02080604020202020204" pitchFamily="34" charset="0"/>
-              <a:ea typeface="SimSun" pitchFamily="2" charset="-122"/>
-            </a:endParaRPr>
-          </a:p>
-        </p:txBody>
-      </p:sp>
     </p:spTree>
   </p:cSld>
   <p:clrMapOvr>
@@ -7224,12 +7360,10 @@
           <a:bodyPr/>
           <a:p>
             <a:r>
-              <a:rPr lang="en-US" sz="2800">
-                <a:sym typeface="+mn-ea"/>
-              </a:rPr>
-              <a:t>Emp_length and Verification Status - Loan Status</a:t>
-            </a:r>
-            <a:endParaRPr lang="en-US" sz="2800"/>
+              <a:rPr lang="en-US" sz="3200"/>
+              <a:t>Impact of Home_ownership &amp; Purpose - Loan Status</a:t>
+            </a:r>
+            <a:endParaRPr lang="en-US" sz="3200"/>
           </a:p>
         </p:txBody>
       </p:sp>
@@ -7265,8 +7399,8 @@
         </p:blipFill>
         <p:spPr>
           <a:xfrm>
-            <a:off x="6060440" y="2569210"/>
-            <a:ext cx="5753100" cy="3219450"/>
+            <a:off x="266065" y="3241040"/>
+            <a:ext cx="5372100" cy="3486150"/>
           </a:xfrm>
           <a:prstGeom prst="rect">
             <a:avLst/>
@@ -7303,8 +7437,8 @@
         </p:blipFill>
         <p:spPr>
           <a:xfrm>
-            <a:off x="345440" y="2569210"/>
-            <a:ext cx="5715000" cy="3219450"/>
+            <a:off x="5871210" y="3241040"/>
+            <a:ext cx="5372100" cy="3486150"/>
           </a:xfrm>
           <a:prstGeom prst="rect">
             <a:avLst/>
@@ -7313,14 +7447,14 @@
       </p:pic>
       <p:sp>
         <p:nvSpPr>
-          <p:cNvPr id="7" name="Text Box 6"/>
+          <p:cNvPr id="6" name="Text Box 5"/>
           <p:cNvSpPr txBox="1"/>
           <p:nvPr/>
         </p:nvSpPr>
         <p:spPr>
           <a:xfrm>
-            <a:off x="610235" y="956310"/>
-            <a:ext cx="11203305" cy="1168400"/>
+            <a:off x="574675" y="1280795"/>
+            <a:ext cx="10858500" cy="737235"/>
           </a:xfrm>
           <a:prstGeom prst="rect">
             <a:avLst/>
@@ -7328,7 +7462,7 @@
           <a:noFill/>
         </p:spPr>
         <p:txBody>
-          <a:bodyPr wrap="square" rtlCol="0" anchor="t">
+          <a:bodyPr wrap="square" rtlCol="0">
             <a:spAutoFit/>
           </a:bodyPr>
           <a:p>
@@ -7336,12 +7470,19 @@
               <a:buFont typeface="Arial" panose="02080604020202020204" pitchFamily="34" charset="0"/>
               <a:buChar char="•"/>
             </a:pPr>
-            <a:endParaRPr lang="en-US" sz="1400">
-              <a:solidFill>
-                <a:schemeClr val="tx1"/>
-              </a:solidFill>
-              <a:sym typeface="+mn-ea"/>
-            </a:endParaRPr>
+            <a:r>
+              <a:rPr lang="en-US" sz="1400"/>
+              <a:t>High chunk of loans (23.9% + 19.6% = </a:t>
+            </a:r>
+            <a:r>
+              <a:rPr lang="en-US" sz="1400" b="1"/>
+              <a:t>43.5%</a:t>
+            </a:r>
+            <a:r>
+              <a:rPr lang="en-US" sz="1400"/>
+              <a:t>) are taken for debt_consolidation purpose and the borrowers of these loans stay in rented house or Mortgaged their house.</a:t>
+            </a:r>
+            <a:endParaRPr lang="en-US" sz="1400"/>
           </a:p>
           <a:p>
             <a:pPr marL="285750" indent="-285750">
@@ -7349,75 +7490,29 @@
               <a:buChar char="•"/>
             </a:pPr>
             <a:r>
-              <a:rPr lang="en-US" sz="1400">
-                <a:solidFill>
-                  <a:schemeClr val="tx1"/>
-                </a:solidFill>
-                <a:sym typeface="+mn-ea"/>
-              </a:rPr>
-              <a:t>Borrowers who have 10+ years of employment years and whose income is verified by lending company are highest 9%. And thier default rate is maximum i.e. 17.2%. </a:t>
-            </a:r>
-            <a:endParaRPr lang="en-US" sz="1400">
-              <a:solidFill>
-                <a:schemeClr val="tx1"/>
-              </a:solidFill>
-              <a:sym typeface="+mn-ea"/>
-            </a:endParaRPr>
-          </a:p>
-          <a:p>
-            <a:pPr marL="285750" indent="-285750">
-              <a:buFont typeface="Arial" panose="02080604020202020204" pitchFamily="34" charset="0"/>
-              <a:buChar char="•"/>
-            </a:pPr>
-            <a:r>
-              <a:rPr lang="en-US" sz="1400">
-                <a:solidFill>
-                  <a:schemeClr val="tx1"/>
-                </a:solidFill>
-                <a:sym typeface="+mn-ea"/>
-              </a:rPr>
-              <a:t>This is not a good situation for the company.</a:t>
-            </a:r>
-            <a:endParaRPr lang="en-US" sz="1400">
-              <a:solidFill>
-                <a:schemeClr val="tx1"/>
-              </a:solidFill>
-              <a:sym typeface="+mn-ea"/>
-            </a:endParaRPr>
-          </a:p>
-          <a:p>
-            <a:pPr marL="285750" indent="-285750">
-              <a:buFont typeface="Arial" panose="02080604020202020204" pitchFamily="34" charset="0"/>
-              <a:buChar char="•"/>
-            </a:pPr>
-            <a:r>
-              <a:rPr lang="en-US" sz="1400">
-                <a:sym typeface="+mn-ea"/>
-              </a:rPr>
-              <a:t>This is the criteria where company should look into it. </a:t>
-            </a:r>
-            <a:endParaRPr lang="en-US" sz="1400">
-              <a:sym typeface="+mn-ea"/>
-            </a:endParaRPr>
-          </a:p>
-        </p:txBody>
-      </p:sp>
-      <p:sp>
-        <p:nvSpPr>
-          <p:cNvPr id="8" name="Rectangles 7"/>
+              <a:rPr lang="en-US" sz="1400"/>
+              <a:t>And there is almost 15% chance of loan getting defaulted which is high and serious.</a:t>
+            </a:r>
+            <a:endParaRPr lang="en-US" sz="1400"/>
+          </a:p>
+        </p:txBody>
+      </p:sp>
+      <p:sp>
+        <p:nvSpPr>
+          <p:cNvPr id="7" name="Rectangles 6"/>
           <p:cNvSpPr/>
           <p:nvPr/>
         </p:nvSpPr>
         <p:spPr>
           <a:xfrm>
-            <a:off x="4749165" y="3295015"/>
-            <a:ext cx="685800" cy="228600"/>
+            <a:off x="1374775" y="3814445"/>
+            <a:ext cx="285750" cy="266700"/>
           </a:xfrm>
           <a:prstGeom prst="rect">
             <a:avLst/>
           </a:prstGeom>
           <a:noFill/>
-          <a:ln w="28575" cap="flat" cmpd="sng" algn="ctr">
+          <a:ln w="19050" cap="flat" cmpd="sng" algn="ctr">
             <a:solidFill>
               <a:srgbClr val="FF0000"/>
             </a:solidFill>
@@ -7478,20 +7573,20 @@
       </p:sp>
       <p:sp>
         <p:nvSpPr>
-          <p:cNvPr id="9" name="Rectangles 8"/>
+          <p:cNvPr id="8" name="Rectangles 7"/>
           <p:cNvSpPr/>
           <p:nvPr/>
         </p:nvSpPr>
         <p:spPr>
           <a:xfrm>
-            <a:off x="10524490" y="3295015"/>
-            <a:ext cx="685800" cy="228600"/>
+            <a:off x="1374775" y="5303520"/>
+            <a:ext cx="285750" cy="266700"/>
           </a:xfrm>
           <a:prstGeom prst="rect">
             <a:avLst/>
           </a:prstGeom>
           <a:noFill/>
-          <a:ln w="28575" cap="flat" cmpd="sng" algn="ctr">
+          <a:ln w="19050" cap="flat" cmpd="sng" algn="ctr">
             <a:solidFill>
               <a:srgbClr val="FF0000"/>
             </a:solidFill>
@@ -7550,6 +7645,154 @@
           </a:p>
         </p:txBody>
       </p:sp>
+      <p:sp>
+        <p:nvSpPr>
+          <p:cNvPr id="9" name="Rectangles 8"/>
+          <p:cNvSpPr/>
+          <p:nvPr/>
+        </p:nvSpPr>
+        <p:spPr>
+          <a:xfrm>
+            <a:off x="7031355" y="3748405"/>
+            <a:ext cx="285750" cy="266700"/>
+          </a:xfrm>
+          <a:prstGeom prst="rect">
+            <a:avLst/>
+          </a:prstGeom>
+          <a:noFill/>
+          <a:ln w="19050" cap="flat" cmpd="sng" algn="ctr">
+            <a:solidFill>
+              <a:srgbClr val="FF0000"/>
+            </a:solidFill>
+            <a:prstDash val="solid"/>
+            <a:round/>
+            <a:headEnd type="none" w="med" len="med"/>
+            <a:tailEnd type="none" w="med" len="med"/>
+          </a:ln>
+          <a:extLst>
+            <a:ext uri="{909E8E84-426E-40DD-AFC4-6F175D3DCCD1}">
+              <a14:hiddenFill xmlns:a14="http://schemas.microsoft.com/office/drawing/2010/main">
+                <a:gradFill rotWithShape="0">
+                  <a:gsLst>
+                    <a:gs pos="0">
+                      <a:schemeClr val="accent1"/>
+                    </a:gs>
+                    <a:gs pos="100000">
+                      <a:schemeClr val="accent2"/>
+                    </a:gs>
+                  </a:gsLst>
+                  <a:lin ang="5400000" scaled="1"/>
+                </a:gradFill>
+              </a14:hiddenFill>
+            </a:ext>
+          </a:extLst>
+        </p:spPr>
+        <p:txBody>
+          <a:bodyPr vert="horz" wrap="none" lIns="91440" tIns="45720" rIns="91440" bIns="45720" numCol="1" anchor="ctr" anchorCtr="0" compatLnSpc="1"/>
+          <a:p>
+            <a:pPr marL="0" marR="0" indent="0" algn="l" defTabSz="914400" rtl="0" eaLnBrk="1" fontAlgn="base" latinLnBrk="0" hangingPunct="1">
+              <a:lnSpc>
+                <a:spcPct val="100000"/>
+              </a:lnSpc>
+              <a:spcBef>
+                <a:spcPct val="0"/>
+              </a:spcBef>
+              <a:spcAft>
+                <a:spcPct val="0"/>
+              </a:spcAft>
+              <a:buClrTx/>
+              <a:buSzTx/>
+              <a:buFontTx/>
+              <a:buNone/>
+            </a:pPr>
+            <a:endParaRPr kumimoji="0" lang="zh-CN" altLang="en-US" sz="1800" b="0" i="0" u="none" strike="noStrike" cap="none" normalizeH="0" baseline="0" smtClean="0">
+              <a:ln>
+                <a:noFill/>
+              </a:ln>
+              <a:solidFill>
+                <a:schemeClr val="tx1"/>
+              </a:solidFill>
+              <a:effectLst/>
+              <a:latin typeface="Arial" panose="02080604020202020204" pitchFamily="34" charset="0"/>
+              <a:ea typeface="SimSun" pitchFamily="2" charset="-122"/>
+            </a:endParaRPr>
+          </a:p>
+        </p:txBody>
+      </p:sp>
+      <p:sp>
+        <p:nvSpPr>
+          <p:cNvPr id="10" name="Rectangles 9"/>
+          <p:cNvSpPr/>
+          <p:nvPr/>
+        </p:nvSpPr>
+        <p:spPr>
+          <a:xfrm>
+            <a:off x="7031355" y="5303520"/>
+            <a:ext cx="285750" cy="266700"/>
+          </a:xfrm>
+          <a:prstGeom prst="rect">
+            <a:avLst/>
+          </a:prstGeom>
+          <a:noFill/>
+          <a:ln w="19050" cap="flat" cmpd="sng" algn="ctr">
+            <a:solidFill>
+              <a:srgbClr val="FF0000"/>
+            </a:solidFill>
+            <a:prstDash val="solid"/>
+            <a:round/>
+            <a:headEnd type="none" w="med" len="med"/>
+            <a:tailEnd type="none" w="med" len="med"/>
+          </a:ln>
+          <a:extLst>
+            <a:ext uri="{909E8E84-426E-40DD-AFC4-6F175D3DCCD1}">
+              <a14:hiddenFill xmlns:a14="http://schemas.microsoft.com/office/drawing/2010/main">
+                <a:gradFill rotWithShape="0">
+                  <a:gsLst>
+                    <a:gs pos="0">
+                      <a:schemeClr val="accent1"/>
+                    </a:gs>
+                    <a:gs pos="100000">
+                      <a:schemeClr val="accent2"/>
+                    </a:gs>
+                  </a:gsLst>
+                  <a:lin ang="5400000" scaled="1"/>
+                </a:gradFill>
+              </a14:hiddenFill>
+            </a:ext>
+          </a:extLst>
+        </p:spPr>
+        <p:txBody>
+          <a:bodyPr vert="horz" wrap="none" lIns="91440" tIns="45720" rIns="91440" bIns="45720" numCol="1" anchor="ctr" anchorCtr="0" compatLnSpc="1"/>
+          <a:p>
+            <a:pPr marL="0" marR="0" indent="0" algn="l" defTabSz="914400" rtl="0" eaLnBrk="1" fontAlgn="base" latinLnBrk="0" hangingPunct="1">
+              <a:lnSpc>
+                <a:spcPct val="100000"/>
+              </a:lnSpc>
+              <a:spcBef>
+                <a:spcPct val="0"/>
+              </a:spcBef>
+              <a:spcAft>
+                <a:spcPct val="0"/>
+              </a:spcAft>
+              <a:buClrTx/>
+              <a:buSzTx/>
+              <a:buFontTx/>
+              <a:buNone/>
+            </a:pPr>
+            <a:endParaRPr kumimoji="0" lang="zh-CN" altLang="en-US" sz="1800" b="0" i="0" u="none" strike="noStrike" cap="none" normalizeH="0" baseline="0" smtClean="0">
+              <a:ln>
+                <a:noFill/>
+              </a:ln>
+              <a:solidFill>
+                <a:schemeClr val="tx1"/>
+              </a:solidFill>
+              <a:effectLst/>
+              <a:latin typeface="Arial" panose="02080604020202020204" pitchFamily="34" charset="0"/>
+              <a:ea typeface="SimSun" pitchFamily="2" charset="-122"/>
+            </a:endParaRPr>
+          </a:p>
+        </p:txBody>
+      </p:sp>
     </p:spTree>
   </p:cSld>
   <p:clrMapOvr>
@@ -7583,8 +7826,12 @@
           <a:bodyPr/>
           <a:p>
             <a:r>
+              <a:rPr lang="en-US" b="1"/>
+              <a:t>Loan Amount</a:t>
+            </a:r>
+            <a:r>
               <a:rPr lang="en-US"/>
-              <a:t>Home_ownership &amp; Purpose - Loan Status</a:t>
+              <a:t> for different types of loans</a:t>
             </a:r>
             <a:endParaRPr lang="en-US"/>
           </a:p>
@@ -7622,8 +7869,8 @@
         </p:blipFill>
         <p:spPr>
           <a:xfrm>
-            <a:off x="266065" y="3241040"/>
-            <a:ext cx="5372100" cy="3486150"/>
+            <a:off x="325120" y="1366520"/>
+            <a:ext cx="2868295" cy="2025650"/>
           </a:xfrm>
           <a:prstGeom prst="rect">
             <a:avLst/>
@@ -7660,590 +7907,6 @@
         </p:blipFill>
         <p:spPr>
           <a:xfrm>
-            <a:off x="5871210" y="3241040"/>
-            <a:ext cx="5372100" cy="3486150"/>
-          </a:xfrm>
-          <a:prstGeom prst="rect">
-            <a:avLst/>
-          </a:prstGeom>
-        </p:spPr>
-      </p:pic>
-      <p:sp>
-        <p:nvSpPr>
-          <p:cNvPr id="6" name="Text Box 5"/>
-          <p:cNvSpPr txBox="1"/>
-          <p:nvPr/>
-        </p:nvSpPr>
-        <p:spPr>
-          <a:xfrm>
-            <a:off x="574675" y="1280795"/>
-            <a:ext cx="10858500" cy="737235"/>
-          </a:xfrm>
-          <a:prstGeom prst="rect">
-            <a:avLst/>
-          </a:prstGeom>
-          <a:noFill/>
-        </p:spPr>
-        <p:txBody>
-          <a:bodyPr wrap="square" rtlCol="0">
-            <a:spAutoFit/>
-          </a:bodyPr>
-          <a:p>
-            <a:pPr marL="285750" indent="-285750">
-              <a:buFont typeface="Arial" panose="02080604020202020204" pitchFamily="34" charset="0"/>
-              <a:buChar char="•"/>
-            </a:pPr>
-            <a:r>
-              <a:rPr lang="en-US" sz="1400"/>
-              <a:t>High chunk of loans (23.9% + 19.6% = </a:t>
-            </a:r>
-            <a:r>
-              <a:rPr lang="en-US" sz="1400" b="1"/>
-              <a:t>43.5%</a:t>
-            </a:r>
-            <a:r>
-              <a:rPr lang="en-US" sz="1400"/>
-              <a:t>) are taken for debt_consolidation purpose and the borrowers of these loans stays in rented house or Mortgaged thier house.</a:t>
-            </a:r>
-            <a:endParaRPr lang="en-US" sz="1400"/>
-          </a:p>
-          <a:p>
-            <a:pPr marL="285750" indent="-285750">
-              <a:buFont typeface="Arial" panose="02080604020202020204" pitchFamily="34" charset="0"/>
-              <a:buChar char="•"/>
-            </a:pPr>
-            <a:r>
-              <a:rPr lang="en-US" sz="1400"/>
-              <a:t>And there is almost 15% chance of loan getting defaulted which is high and serious.</a:t>
-            </a:r>
-            <a:endParaRPr lang="en-US" sz="1400"/>
-          </a:p>
-        </p:txBody>
-      </p:sp>
-      <p:sp>
-        <p:nvSpPr>
-          <p:cNvPr id="7" name="Rectangles 6"/>
-          <p:cNvSpPr/>
-          <p:nvPr/>
-        </p:nvSpPr>
-        <p:spPr>
-          <a:xfrm>
-            <a:off x="1374775" y="3814445"/>
-            <a:ext cx="285750" cy="266700"/>
-          </a:xfrm>
-          <a:prstGeom prst="rect">
-            <a:avLst/>
-          </a:prstGeom>
-          <a:noFill/>
-          <a:ln w="19050" cap="flat" cmpd="sng" algn="ctr">
-            <a:solidFill>
-              <a:srgbClr val="FF0000"/>
-            </a:solidFill>
-            <a:prstDash val="solid"/>
-            <a:round/>
-            <a:headEnd type="none" w="med" len="med"/>
-            <a:tailEnd type="none" w="med" len="med"/>
-          </a:ln>
-          <a:extLst>
-            <a:ext uri="{909E8E84-426E-40DD-AFC4-6F175D3DCCD1}">
-              <a14:hiddenFill xmlns:a14="http://schemas.microsoft.com/office/drawing/2010/main">
-                <a:gradFill rotWithShape="0">
-                  <a:gsLst>
-                    <a:gs pos="0">
-                      <a:schemeClr val="accent1"/>
-                    </a:gs>
-                    <a:gs pos="100000">
-                      <a:schemeClr val="accent2"/>
-                    </a:gs>
-                  </a:gsLst>
-                  <a:lin ang="5400000" scaled="1"/>
-                </a:gradFill>
-              </a14:hiddenFill>
-            </a:ext>
-          </a:extLst>
-        </p:spPr>
-        <p:txBody>
-          <a:bodyPr vert="horz" wrap="none" lIns="91440" tIns="45720" rIns="91440" bIns="45720" numCol="1" anchor="ctr" anchorCtr="0" compatLnSpc="1"/>
-          <a:p>
-            <a:pPr marL="0" marR="0" indent="0" algn="l" defTabSz="914400" rtl="0" eaLnBrk="1" fontAlgn="base" latinLnBrk="0" hangingPunct="1">
-              <a:lnSpc>
-                <a:spcPct val="100000"/>
-              </a:lnSpc>
-              <a:spcBef>
-                <a:spcPct val="0"/>
-              </a:spcBef>
-              <a:spcAft>
-                <a:spcPct val="0"/>
-              </a:spcAft>
-              <a:buClrTx/>
-              <a:buSzTx/>
-              <a:buFontTx/>
-              <a:buNone/>
-            </a:pPr>
-            <a:endParaRPr kumimoji="0" lang="zh-CN" altLang="en-US" sz="1800" b="0" i="0" u="none" strike="noStrike" cap="none" normalizeH="0" baseline="0" smtClean="0">
-              <a:ln>
-                <a:noFill/>
-              </a:ln>
-              <a:solidFill>
-                <a:schemeClr val="tx1"/>
-              </a:solidFill>
-              <a:effectLst/>
-              <a:latin typeface="Arial" panose="02080604020202020204" pitchFamily="34" charset="0"/>
-              <a:ea typeface="SimSun" pitchFamily="2" charset="-122"/>
-            </a:endParaRPr>
-          </a:p>
-        </p:txBody>
-      </p:sp>
-      <p:sp>
-        <p:nvSpPr>
-          <p:cNvPr id="8" name="Rectangles 7"/>
-          <p:cNvSpPr/>
-          <p:nvPr/>
-        </p:nvSpPr>
-        <p:spPr>
-          <a:xfrm>
-            <a:off x="1374775" y="5303520"/>
-            <a:ext cx="285750" cy="266700"/>
-          </a:xfrm>
-          <a:prstGeom prst="rect">
-            <a:avLst/>
-          </a:prstGeom>
-          <a:noFill/>
-          <a:ln w="19050" cap="flat" cmpd="sng" algn="ctr">
-            <a:solidFill>
-              <a:srgbClr val="FF0000"/>
-            </a:solidFill>
-            <a:prstDash val="solid"/>
-            <a:round/>
-            <a:headEnd type="none" w="med" len="med"/>
-            <a:tailEnd type="none" w="med" len="med"/>
-          </a:ln>
-          <a:extLst>
-            <a:ext uri="{909E8E84-426E-40DD-AFC4-6F175D3DCCD1}">
-              <a14:hiddenFill xmlns:a14="http://schemas.microsoft.com/office/drawing/2010/main">
-                <a:gradFill rotWithShape="0">
-                  <a:gsLst>
-                    <a:gs pos="0">
-                      <a:schemeClr val="accent1"/>
-                    </a:gs>
-                    <a:gs pos="100000">
-                      <a:schemeClr val="accent2"/>
-                    </a:gs>
-                  </a:gsLst>
-                  <a:lin ang="5400000" scaled="1"/>
-                </a:gradFill>
-              </a14:hiddenFill>
-            </a:ext>
-          </a:extLst>
-        </p:spPr>
-        <p:txBody>
-          <a:bodyPr vert="horz" wrap="none" lIns="91440" tIns="45720" rIns="91440" bIns="45720" numCol="1" anchor="ctr" anchorCtr="0" compatLnSpc="1"/>
-          <a:p>
-            <a:pPr marL="0" marR="0" indent="0" algn="l" defTabSz="914400" rtl="0" eaLnBrk="1" fontAlgn="base" latinLnBrk="0" hangingPunct="1">
-              <a:lnSpc>
-                <a:spcPct val="100000"/>
-              </a:lnSpc>
-              <a:spcBef>
-                <a:spcPct val="0"/>
-              </a:spcBef>
-              <a:spcAft>
-                <a:spcPct val="0"/>
-              </a:spcAft>
-              <a:buClrTx/>
-              <a:buSzTx/>
-              <a:buFontTx/>
-              <a:buNone/>
-            </a:pPr>
-            <a:endParaRPr kumimoji="0" lang="zh-CN" altLang="en-US" sz="1800" b="0" i="0" u="none" strike="noStrike" cap="none" normalizeH="0" baseline="0" smtClean="0">
-              <a:ln>
-                <a:noFill/>
-              </a:ln>
-              <a:solidFill>
-                <a:schemeClr val="tx1"/>
-              </a:solidFill>
-              <a:effectLst/>
-              <a:latin typeface="Arial" panose="02080604020202020204" pitchFamily="34" charset="0"/>
-              <a:ea typeface="SimSun" pitchFamily="2" charset="-122"/>
-            </a:endParaRPr>
-          </a:p>
-        </p:txBody>
-      </p:sp>
-      <p:sp>
-        <p:nvSpPr>
-          <p:cNvPr id="9" name="Rectangles 8"/>
-          <p:cNvSpPr/>
-          <p:nvPr/>
-        </p:nvSpPr>
-        <p:spPr>
-          <a:xfrm>
-            <a:off x="7031355" y="3748405"/>
-            <a:ext cx="285750" cy="266700"/>
-          </a:xfrm>
-          <a:prstGeom prst="rect">
-            <a:avLst/>
-          </a:prstGeom>
-          <a:noFill/>
-          <a:ln w="19050" cap="flat" cmpd="sng" algn="ctr">
-            <a:solidFill>
-              <a:srgbClr val="FF0000"/>
-            </a:solidFill>
-            <a:prstDash val="solid"/>
-            <a:round/>
-            <a:headEnd type="none" w="med" len="med"/>
-            <a:tailEnd type="none" w="med" len="med"/>
-          </a:ln>
-          <a:extLst>
-            <a:ext uri="{909E8E84-426E-40DD-AFC4-6F175D3DCCD1}">
-              <a14:hiddenFill xmlns:a14="http://schemas.microsoft.com/office/drawing/2010/main">
-                <a:gradFill rotWithShape="0">
-                  <a:gsLst>
-                    <a:gs pos="0">
-                      <a:schemeClr val="accent1"/>
-                    </a:gs>
-                    <a:gs pos="100000">
-                      <a:schemeClr val="accent2"/>
-                    </a:gs>
-                  </a:gsLst>
-                  <a:lin ang="5400000" scaled="1"/>
-                </a:gradFill>
-              </a14:hiddenFill>
-            </a:ext>
-          </a:extLst>
-        </p:spPr>
-        <p:txBody>
-          <a:bodyPr vert="horz" wrap="none" lIns="91440" tIns="45720" rIns="91440" bIns="45720" numCol="1" anchor="ctr" anchorCtr="0" compatLnSpc="1"/>
-          <a:p>
-            <a:pPr marL="0" marR="0" indent="0" algn="l" defTabSz="914400" rtl="0" eaLnBrk="1" fontAlgn="base" latinLnBrk="0" hangingPunct="1">
-              <a:lnSpc>
-                <a:spcPct val="100000"/>
-              </a:lnSpc>
-              <a:spcBef>
-                <a:spcPct val="0"/>
-              </a:spcBef>
-              <a:spcAft>
-                <a:spcPct val="0"/>
-              </a:spcAft>
-              <a:buClrTx/>
-              <a:buSzTx/>
-              <a:buFontTx/>
-              <a:buNone/>
-            </a:pPr>
-            <a:endParaRPr kumimoji="0" lang="zh-CN" altLang="en-US" sz="1800" b="0" i="0" u="none" strike="noStrike" cap="none" normalizeH="0" baseline="0" smtClean="0">
-              <a:ln>
-                <a:noFill/>
-              </a:ln>
-              <a:solidFill>
-                <a:schemeClr val="tx1"/>
-              </a:solidFill>
-              <a:effectLst/>
-              <a:latin typeface="Arial" panose="02080604020202020204" pitchFamily="34" charset="0"/>
-              <a:ea typeface="SimSun" pitchFamily="2" charset="-122"/>
-            </a:endParaRPr>
-          </a:p>
-        </p:txBody>
-      </p:sp>
-      <p:sp>
-        <p:nvSpPr>
-          <p:cNvPr id="10" name="Rectangles 9"/>
-          <p:cNvSpPr/>
-          <p:nvPr/>
-        </p:nvSpPr>
-        <p:spPr>
-          <a:xfrm>
-            <a:off x="7031355" y="5303520"/>
-            <a:ext cx="285750" cy="266700"/>
-          </a:xfrm>
-          <a:prstGeom prst="rect">
-            <a:avLst/>
-          </a:prstGeom>
-          <a:noFill/>
-          <a:ln w="19050" cap="flat" cmpd="sng" algn="ctr">
-            <a:solidFill>
-              <a:srgbClr val="FF0000"/>
-            </a:solidFill>
-            <a:prstDash val="solid"/>
-            <a:round/>
-            <a:headEnd type="none" w="med" len="med"/>
-            <a:tailEnd type="none" w="med" len="med"/>
-          </a:ln>
-          <a:extLst>
-            <a:ext uri="{909E8E84-426E-40DD-AFC4-6F175D3DCCD1}">
-              <a14:hiddenFill xmlns:a14="http://schemas.microsoft.com/office/drawing/2010/main">
-                <a:gradFill rotWithShape="0">
-                  <a:gsLst>
-                    <a:gs pos="0">
-                      <a:schemeClr val="accent1"/>
-                    </a:gs>
-                    <a:gs pos="100000">
-                      <a:schemeClr val="accent2"/>
-                    </a:gs>
-                  </a:gsLst>
-                  <a:lin ang="5400000" scaled="1"/>
-                </a:gradFill>
-              </a14:hiddenFill>
-            </a:ext>
-          </a:extLst>
-        </p:spPr>
-        <p:txBody>
-          <a:bodyPr vert="horz" wrap="none" lIns="91440" tIns="45720" rIns="91440" bIns="45720" numCol="1" anchor="ctr" anchorCtr="0" compatLnSpc="1"/>
-          <a:p>
-            <a:pPr marL="0" marR="0" indent="0" algn="l" defTabSz="914400" rtl="0" eaLnBrk="1" fontAlgn="base" latinLnBrk="0" hangingPunct="1">
-              <a:lnSpc>
-                <a:spcPct val="100000"/>
-              </a:lnSpc>
-              <a:spcBef>
-                <a:spcPct val="0"/>
-              </a:spcBef>
-              <a:spcAft>
-                <a:spcPct val="0"/>
-              </a:spcAft>
-              <a:buClrTx/>
-              <a:buSzTx/>
-              <a:buFontTx/>
-              <a:buNone/>
-            </a:pPr>
-            <a:endParaRPr kumimoji="0" lang="zh-CN" altLang="en-US" sz="1800" b="0" i="0" u="none" strike="noStrike" cap="none" normalizeH="0" baseline="0" smtClean="0">
-              <a:ln>
-                <a:noFill/>
-              </a:ln>
-              <a:solidFill>
-                <a:schemeClr val="tx1"/>
-              </a:solidFill>
-              <a:effectLst/>
-              <a:latin typeface="Arial" panose="02080604020202020204" pitchFamily="34" charset="0"/>
-              <a:ea typeface="SimSun" pitchFamily="2" charset="-122"/>
-            </a:endParaRPr>
-          </a:p>
-        </p:txBody>
-      </p:sp>
-    </p:spTree>
-  </p:cSld>
-  <p:clrMapOvr>
-    <a:masterClrMapping/>
-  </p:clrMapOvr>
-</p:sld>
-</file>
-
-<file path=ppt/slides/slide2.xml><?xml version="1.0" encoding="utf-8"?>
-<p:sld xmlns:a="http://schemas.openxmlformats.org/drawingml/2006/main" xmlns:r="http://schemas.openxmlformats.org/officeDocument/2006/relationships" xmlns:p="http://schemas.openxmlformats.org/presentationml/2006/main">
-  <p:cSld>
-    <p:spTree>
-      <p:nvGrpSpPr>
-        <p:cNvPr id="1" name=""/>
-        <p:cNvGrpSpPr/>
-        <p:nvPr/>
-      </p:nvGrpSpPr>
-      <p:grpSpPr/>
-      <p:sp>
-        <p:nvSpPr>
-          <p:cNvPr id="2" name="Title 1"/>
-          <p:cNvSpPr>
-            <a:spLocks noGrp="1"/>
-          </p:cNvSpPr>
-          <p:nvPr>
-            <p:ph type="title"/>
-          </p:nvPr>
-        </p:nvSpPr>
-        <p:spPr/>
-        <p:txBody>
-          <a:bodyPr/>
-          <a:p>
-            <a:r>
-              <a:rPr lang="en-US"/>
-              <a:t>Business Objective</a:t>
-            </a:r>
-            <a:endParaRPr lang="en-US"/>
-          </a:p>
-        </p:txBody>
-      </p:sp>
-      <p:sp>
-        <p:nvSpPr>
-          <p:cNvPr id="3" name="Content Placeholder 2"/>
-          <p:cNvSpPr>
-            <a:spLocks noGrp="1"/>
-          </p:cNvSpPr>
-          <p:nvPr>
-            <p:ph idx="1"/>
-          </p:nvPr>
-        </p:nvSpPr>
-        <p:spPr/>
-        <p:txBody>
-          <a:bodyPr/>
-          <a:p>
-            <a:r>
-              <a:rPr lang="en-US" sz="2000"/>
-              <a:t>The company wants to understand the driving factors behind loan default</a:t>
-            </a:r>
-            <a:endParaRPr lang="en-US" sz="2000"/>
-          </a:p>
-          <a:p>
-            <a:r>
-              <a:rPr lang="en-US" sz="2000"/>
-              <a:t>The variables which are strong indicators of default. </a:t>
-            </a:r>
-            <a:endParaRPr lang="en-US" sz="2000"/>
-          </a:p>
-          <a:p>
-            <a:r>
-              <a:rPr lang="en-US" sz="2000"/>
-              <a:t>The company can utilise this knowledge for its portfolio and risk assessment.</a:t>
-            </a:r>
-            <a:endParaRPr lang="en-US" sz="2000"/>
-          </a:p>
-        </p:txBody>
-      </p:sp>
-      <p:pic>
-        <p:nvPicPr>
-          <p:cNvPr id="5" name="Picture 4"/>
-          <p:cNvPicPr>
-            <a:picLocks noChangeAspect="1"/>
-          </p:cNvPicPr>
-          <p:nvPr/>
-        </p:nvPicPr>
-        <p:blipFill>
-          <a:blip r:embed="rId1">
-            <a:clrChange>
-              <a:clrFrom>
-                <a:srgbClr val="FFFFFF">
-                  <a:alpha val="100000"/>
-                </a:srgbClr>
-              </a:clrFrom>
-              <a:clrTo>
-                <a:srgbClr val="FFFFFF">
-                  <a:alpha val="100000"/>
-                  <a:alpha val="0"/>
-                </a:srgbClr>
-              </a:clrTo>
-            </a:clrChange>
-          </a:blip>
-          <a:stretch>
-            <a:fillRect/>
-          </a:stretch>
-        </p:blipFill>
-        <p:spPr>
-          <a:xfrm>
-            <a:off x="950595" y="3295650"/>
-            <a:ext cx="2621280" cy="2533650"/>
-          </a:xfrm>
-          <a:prstGeom prst="rect">
-            <a:avLst/>
-          </a:prstGeom>
-        </p:spPr>
-      </p:pic>
-    </p:spTree>
-  </p:cSld>
-  <p:clrMapOvr>
-    <a:masterClrMapping/>
-  </p:clrMapOvr>
-</p:sld>
-</file>
-
-<file path=ppt/slides/slide20.xml><?xml version="1.0" encoding="utf-8"?>
-<p:sld xmlns:a="http://schemas.openxmlformats.org/drawingml/2006/main" xmlns:r="http://schemas.openxmlformats.org/officeDocument/2006/relationships" xmlns:p="http://schemas.openxmlformats.org/presentationml/2006/main">
-  <p:cSld>
-    <p:spTree>
-      <p:nvGrpSpPr>
-        <p:cNvPr id="1" name=""/>
-        <p:cNvGrpSpPr/>
-        <p:nvPr/>
-      </p:nvGrpSpPr>
-      <p:grpSpPr/>
-      <p:sp>
-        <p:nvSpPr>
-          <p:cNvPr id="2" name="Title 1"/>
-          <p:cNvSpPr>
-            <a:spLocks noGrp="1"/>
-          </p:cNvSpPr>
-          <p:nvPr>
-            <p:ph type="title"/>
-          </p:nvPr>
-        </p:nvSpPr>
-        <p:spPr/>
-        <p:txBody>
-          <a:bodyPr/>
-          <a:p>
-            <a:r>
-              <a:rPr lang="en-US" b="1"/>
-              <a:t>Loan Amount</a:t>
-            </a:r>
-            <a:r>
-              <a:rPr lang="en-US"/>
-              <a:t> for different types of loans</a:t>
-            </a:r>
-            <a:endParaRPr lang="en-US"/>
-          </a:p>
-        </p:txBody>
-      </p:sp>
-      <p:pic>
-        <p:nvPicPr>
-          <p:cNvPr id="4" name="Content Placeholder 3"/>
-          <p:cNvPicPr>
-            <a:picLocks noChangeAspect="1"/>
-          </p:cNvPicPr>
-          <p:nvPr>
-            <p:ph idx="1"/>
-          </p:nvPr>
-        </p:nvPicPr>
-        <p:blipFill>
-          <a:blip r:embed="rId1">
-            <a:clrChange>
-              <a:clrFrom>
-                <a:srgbClr val="FFFFFF">
-                  <a:alpha val="100000"/>
-                </a:srgbClr>
-              </a:clrFrom>
-              <a:clrTo>
-                <a:srgbClr val="FFFFFF">
-                  <a:alpha val="100000"/>
-                  <a:alpha val="0"/>
-                </a:srgbClr>
-              </a:clrTo>
-            </a:clrChange>
-          </a:blip>
-          <a:stretch>
-            <a:fillRect/>
-          </a:stretch>
-        </p:blipFill>
-        <p:spPr>
-          <a:xfrm>
-            <a:off x="325120" y="1366520"/>
-            <a:ext cx="2868295" cy="2025650"/>
-          </a:xfrm>
-          <a:prstGeom prst="rect">
-            <a:avLst/>
-          </a:prstGeom>
-        </p:spPr>
-      </p:pic>
-      <p:pic>
-        <p:nvPicPr>
-          <p:cNvPr id="5" name="Picture 4"/>
-          <p:cNvPicPr>
-            <a:picLocks noChangeAspect="1"/>
-          </p:cNvPicPr>
-          <p:nvPr/>
-        </p:nvPicPr>
-        <p:blipFill>
-          <a:blip r:embed="rId2">
-            <a:clrChange>
-              <a:clrFrom>
-                <a:srgbClr val="FFFFFF">
-                  <a:alpha val="100000"/>
-                </a:srgbClr>
-              </a:clrFrom>
-              <a:clrTo>
-                <a:srgbClr val="FFFFFF">
-                  <a:alpha val="100000"/>
-                  <a:alpha val="0"/>
-                </a:srgbClr>
-              </a:clrTo>
-            </a:clrChange>
-          </a:blip>
-          <a:stretch>
-            <a:fillRect/>
-          </a:stretch>
-        </p:blipFill>
-        <p:spPr>
-          <a:xfrm>
             <a:off x="7531735" y="4226560"/>
             <a:ext cx="4486910" cy="2370455"/>
           </a:xfrm>
@@ -9071,7 +8734,7 @@
 </p:sld>
 </file>
 
-<file path=ppt/slides/slide21.xml><?xml version="1.0" encoding="utf-8"?>
+<file path=ppt/slides/slide2.xml><?xml version="1.0" encoding="utf-8"?>
 <p:sld xmlns:a="http://schemas.openxmlformats.org/drawingml/2006/main" xmlns:r="http://schemas.openxmlformats.org/officeDocument/2006/relationships" xmlns:p="http://schemas.openxmlformats.org/presentationml/2006/main">
   <p:cSld>
     <p:spTree>
@@ -9097,7 +8760,7 @@
           <a:p>
             <a:r>
               <a:rPr lang="en-US"/>
-              <a:t>Conclusion</a:t>
+              <a:t>Business Objective</a:t>
             </a:r>
             <a:endParaRPr lang="en-US"/>
           </a:p>
@@ -9113,6 +8776,120 @@
             <p:ph idx="1"/>
           </p:nvPr>
         </p:nvSpPr>
+        <p:spPr/>
+        <p:txBody>
+          <a:bodyPr/>
+          <a:p>
+            <a:r>
+              <a:rPr lang="en-US" sz="2000"/>
+              <a:t>The company wants to understand the driving factors behind loan default</a:t>
+            </a:r>
+            <a:endParaRPr lang="en-US" sz="2000"/>
+          </a:p>
+          <a:p>
+            <a:r>
+              <a:rPr lang="en-US" sz="2000"/>
+              <a:t>The variables which are strong indicators of default. </a:t>
+            </a:r>
+            <a:endParaRPr lang="en-US" sz="2000"/>
+          </a:p>
+          <a:p>
+            <a:r>
+              <a:rPr lang="en-US" sz="2000"/>
+              <a:t>The company can utilise this knowledge for its portfolio and risk assessment.</a:t>
+            </a:r>
+            <a:endParaRPr lang="en-US" sz="2000"/>
+          </a:p>
+        </p:txBody>
+      </p:sp>
+      <p:pic>
+        <p:nvPicPr>
+          <p:cNvPr id="5" name="Picture 4"/>
+          <p:cNvPicPr>
+            <a:picLocks noChangeAspect="1"/>
+          </p:cNvPicPr>
+          <p:nvPr/>
+        </p:nvPicPr>
+        <p:blipFill>
+          <a:blip r:embed="rId1">
+            <a:clrChange>
+              <a:clrFrom>
+                <a:srgbClr val="FFFFFF">
+                  <a:alpha val="100000"/>
+                </a:srgbClr>
+              </a:clrFrom>
+              <a:clrTo>
+                <a:srgbClr val="FFFFFF">
+                  <a:alpha val="100000"/>
+                  <a:alpha val="0"/>
+                </a:srgbClr>
+              </a:clrTo>
+            </a:clrChange>
+          </a:blip>
+          <a:stretch>
+            <a:fillRect/>
+          </a:stretch>
+        </p:blipFill>
+        <p:spPr>
+          <a:xfrm>
+            <a:off x="950595" y="3295650"/>
+            <a:ext cx="2621280" cy="2533650"/>
+          </a:xfrm>
+          <a:prstGeom prst="rect">
+            <a:avLst/>
+          </a:prstGeom>
+        </p:spPr>
+      </p:pic>
+    </p:spTree>
+  </p:cSld>
+  <p:clrMapOvr>
+    <a:masterClrMapping/>
+  </p:clrMapOvr>
+</p:sld>
+</file>
+
+<file path=ppt/slides/slide20.xml><?xml version="1.0" encoding="utf-8"?>
+<p:sld xmlns:a="http://schemas.openxmlformats.org/drawingml/2006/main" xmlns:r="http://schemas.openxmlformats.org/officeDocument/2006/relationships" xmlns:p="http://schemas.openxmlformats.org/presentationml/2006/main">
+  <p:cSld>
+    <p:spTree>
+      <p:nvGrpSpPr>
+        <p:cNvPr id="1" name=""/>
+        <p:cNvGrpSpPr/>
+        <p:nvPr/>
+      </p:nvGrpSpPr>
+      <p:grpSpPr/>
+      <p:sp>
+        <p:nvSpPr>
+          <p:cNvPr id="2" name="Title 1"/>
+          <p:cNvSpPr>
+            <a:spLocks noGrp="1"/>
+          </p:cNvSpPr>
+          <p:nvPr>
+            <p:ph type="title"/>
+          </p:nvPr>
+        </p:nvSpPr>
+        <p:spPr/>
+        <p:txBody>
+          <a:bodyPr/>
+          <a:p>
+            <a:r>
+              <a:rPr lang="en-US"/>
+              <a:t>Conclusion</a:t>
+            </a:r>
+            <a:endParaRPr lang="en-US"/>
+          </a:p>
+        </p:txBody>
+      </p:sp>
+      <p:sp>
+        <p:nvSpPr>
+          <p:cNvPr id="3" name="Content Placeholder 2"/>
+          <p:cNvSpPr>
+            <a:spLocks noGrp="1"/>
+          </p:cNvSpPr>
+          <p:nvPr>
+            <p:ph idx="1"/>
+          </p:nvPr>
+        </p:nvSpPr>
         <p:spPr>
           <a:xfrm>
             <a:off x="609600" y="1174750"/>
@@ -9190,24 +8967,27 @@
               <a:rPr lang="en-US" sz="1400">
                 <a:sym typeface="+mn-ea"/>
               </a:rPr>
-              <a:t>High Interest rates - Interest rate for 60 months tenure loans is higher than that of 36 months loan. </a:t>
+              <a:t>High Revol_util - Higher the amount of credit the borrower is using, higher is the risk of loan repayment.</a:t>
             </a:r>
             <a:endParaRPr lang="en-US" sz="1400">
               <a:sym typeface="+mn-ea"/>
             </a:endParaRPr>
           </a:p>
           <a:p>
-            <a:r>
-              <a:rPr lang="en-US" sz="1400">
+            <a:endParaRPr lang="en-US" sz="1400" b="1">
+              <a:sym typeface="+mn-ea"/>
+            </a:endParaRPr>
+          </a:p>
+          <a:p>
+            <a:pPr marL="0" indent="0">
+              <a:buNone/>
+            </a:pPr>
+            <a:r>
+              <a:rPr lang="en-US" sz="1400" b="1">
                 <a:sym typeface="+mn-ea"/>
               </a:rPr>
-              <a:t>High Revol_util - Higher the amount of credit the borrower is using, higher is the risk of loan repayment.</a:t>
-            </a:r>
-            <a:endParaRPr lang="en-US" sz="1400">
-              <a:sym typeface="+mn-ea"/>
-            </a:endParaRPr>
-          </a:p>
-          <a:p>
+              <a:t>Inferences :</a:t>
+            </a:r>
             <a:endParaRPr lang="en-US" sz="1400">
               <a:sym typeface="+mn-ea"/>
             </a:endParaRPr>
@@ -9227,6 +9007,50 @@
               <a:t>Default rate for the borrowers, who have 10+ years of employment years and their income is also verified, is high</a:t>
             </a:r>
             <a:endParaRPr lang="en-US" sz="1400"/>
+          </a:p>
+          <a:p>
+            <a:r>
+              <a:rPr lang="en-US" sz="1400">
+                <a:sym typeface="+mn-ea"/>
+              </a:rPr>
+              <a:t>For upper grade loans possess </a:t>
+            </a:r>
+            <a:r>
+              <a:rPr lang="en-US" sz="1400" b="1">
+                <a:sym typeface="+mn-ea"/>
+              </a:rPr>
+              <a:t>high loan amount</a:t>
+            </a:r>
+            <a:r>
+              <a:rPr lang="en-US" sz="1400">
+                <a:sym typeface="+mn-ea"/>
+              </a:rPr>
+              <a:t> applied by borrowers - </a:t>
+            </a:r>
+            <a:r>
+              <a:rPr lang="en-US" sz="1400" b="1">
+                <a:sym typeface="+mn-ea"/>
+              </a:rPr>
+              <a:t>loss is high </a:t>
+            </a:r>
+            <a:r>
+              <a:rPr lang="en-US" sz="1400">
+                <a:sym typeface="+mn-ea"/>
+              </a:rPr>
+              <a:t>if a loan is defaulted</a:t>
+            </a:r>
+            <a:endParaRPr lang="en-US" sz="1400"/>
+          </a:p>
+          <a:p>
+            <a:r>
+              <a:rPr lang="en-US" sz="1400">
+                <a:sym typeface="+mn-ea"/>
+              </a:rPr>
+              <a:t>High Interest rates - Interest rate for 60 months tenure loans is higher than that of 36 months loan. </a:t>
+            </a:r>
+            <a:endParaRPr lang="en-US" sz="1400">
+              <a:sym typeface="+mn-ea"/>
+            </a:endParaRPr>
           </a:p>
           <a:p>
             <a:endParaRPr lang="en-US" sz="1400"/>

</xml_diff>